<commit_message>
Final presentation lab 2
</commit_message>
<xml_diff>
--- a/Docs/Hierarchical reward task.pptx
+++ b/Docs/Hierarchical reward task.pptx
@@ -5,7 +5,7 @@
     <p:sldMasterId id="2147483660" r:id="rId1"/>
   </p:sldMasterIdLst>
   <p:notesMasterIdLst>
-    <p:notesMasterId r:id="rId32"/>
+    <p:notesMasterId r:id="rId35"/>
   </p:notesMasterIdLst>
   <p:sldIdLst>
     <p:sldId id="256" r:id="rId2"/>
@@ -13,31 +13,34 @@
     <p:sldId id="266" r:id="rId4"/>
     <p:sldId id="267" r:id="rId5"/>
     <p:sldId id="269" r:id="rId6"/>
-    <p:sldId id="282" r:id="rId7"/>
-    <p:sldId id="268" r:id="rId8"/>
-    <p:sldId id="270" r:id="rId9"/>
-    <p:sldId id="271" r:id="rId10"/>
-    <p:sldId id="273" r:id="rId11"/>
-    <p:sldId id="274" r:id="rId12"/>
-    <p:sldId id="272" r:id="rId13"/>
-    <p:sldId id="275" r:id="rId14"/>
-    <p:sldId id="276" r:id="rId15"/>
-    <p:sldId id="277" r:id="rId16"/>
-    <p:sldId id="278" r:id="rId17"/>
-    <p:sldId id="280" r:id="rId18"/>
-    <p:sldId id="281" r:id="rId19"/>
-    <p:sldId id="283" r:id="rId20"/>
-    <p:sldId id="284" r:id="rId21"/>
-    <p:sldId id="279" r:id="rId22"/>
-    <p:sldId id="285" r:id="rId23"/>
-    <p:sldId id="287" r:id="rId24"/>
-    <p:sldId id="288" r:id="rId25"/>
-    <p:sldId id="289" r:id="rId26"/>
-    <p:sldId id="290" r:id="rId27"/>
-    <p:sldId id="291" r:id="rId28"/>
-    <p:sldId id="292" r:id="rId29"/>
-    <p:sldId id="293" r:id="rId30"/>
-    <p:sldId id="286" r:id="rId31"/>
+    <p:sldId id="296" r:id="rId7"/>
+    <p:sldId id="282" r:id="rId8"/>
+    <p:sldId id="294" r:id="rId9"/>
+    <p:sldId id="295" r:id="rId10"/>
+    <p:sldId id="268" r:id="rId11"/>
+    <p:sldId id="270" r:id="rId12"/>
+    <p:sldId id="271" r:id="rId13"/>
+    <p:sldId id="273" r:id="rId14"/>
+    <p:sldId id="274" r:id="rId15"/>
+    <p:sldId id="272" r:id="rId16"/>
+    <p:sldId id="275" r:id="rId17"/>
+    <p:sldId id="276" r:id="rId18"/>
+    <p:sldId id="277" r:id="rId19"/>
+    <p:sldId id="278" r:id="rId20"/>
+    <p:sldId id="280" r:id="rId21"/>
+    <p:sldId id="281" r:id="rId22"/>
+    <p:sldId id="283" r:id="rId23"/>
+    <p:sldId id="284" r:id="rId24"/>
+    <p:sldId id="279" r:id="rId25"/>
+    <p:sldId id="285" r:id="rId26"/>
+    <p:sldId id="287" r:id="rId27"/>
+    <p:sldId id="288" r:id="rId28"/>
+    <p:sldId id="289" r:id="rId29"/>
+    <p:sldId id="290" r:id="rId30"/>
+    <p:sldId id="291" r:id="rId31"/>
+    <p:sldId id="292" r:id="rId32"/>
+    <p:sldId id="293" r:id="rId33"/>
+    <p:sldId id="286" r:id="rId34"/>
   </p:sldIdLst>
   <p:sldSz cx="17338675" cy="9753600"/>
   <p:notesSz cx="6858000" cy="9144000"/>
@@ -158,13 +161,251 @@
 <file path=ppt/revisionInfo.xml><?xml version="1.0" encoding="utf-8"?>
 <p1510:revInfo xmlns:a="http://schemas.openxmlformats.org/drawingml/2006/main" xmlns:r="http://schemas.openxmlformats.org/officeDocument/2006/relationships" xmlns:p1510="http://schemas.microsoft.com/office/powerpoint/2015/10/main">
   <p1510:revLst>
-    <p1510:client id="{25945966-4CA9-44E9-9F7D-5F3FE70B2F81}" v="487" dt="2021-03-22T10:39:44.697"/>
+    <p1510:client id="{25945966-4CA9-44E9-9F7D-5F3FE70B2F81}" v="543" dt="2021-03-23T12:41:25.297"/>
   </p1510:revLst>
 </p1510:revInfo>
 </file>
 
 <file path=ppt/changesInfos/changesInfo1.xml><?xml version="1.0" encoding="utf-8"?>
 <pc:chgInfo xmlns:a="http://schemas.openxmlformats.org/drawingml/2006/main" xmlns:r="http://schemas.openxmlformats.org/officeDocument/2006/relationships" xmlns:ac="http://schemas.microsoft.com/office/drawing/2013/main/command" xmlns:pc="http://schemas.microsoft.com/office/powerpoint/2013/main/command">
+  <pc:docChgLst>
+    <pc:chgData name="Sven Wientjes" userId="7d731600-f613-4231-8242-4cc0fb25728d" providerId="ADAL" clId="{25945966-4CA9-44E9-9F7D-5F3FE70B2F81}"/>
+    <pc:docChg chg="undo custSel addSld delSld modSld">
+      <pc:chgData name="Sven Wientjes" userId="7d731600-f613-4231-8242-4cc0fb25728d" providerId="ADAL" clId="{25945966-4CA9-44E9-9F7D-5F3FE70B2F81}" dt="2021-03-23T12:41:25.297" v="466"/>
+      <pc:docMkLst>
+        <pc:docMk/>
+      </pc:docMkLst>
+      <pc:sldChg chg="delSp mod">
+        <pc:chgData name="Sven Wientjes" userId="7d731600-f613-4231-8242-4cc0fb25728d" providerId="ADAL" clId="{25945966-4CA9-44E9-9F7D-5F3FE70B2F81}" dt="2021-03-22T18:54:57.101" v="317" actId="478"/>
+        <pc:sldMkLst>
+          <pc:docMk/>
+          <pc:sldMk cId="1728512294" sldId="265"/>
+        </pc:sldMkLst>
+        <pc:picChg chg="del">
+          <ac:chgData name="Sven Wientjes" userId="7d731600-f613-4231-8242-4cc0fb25728d" providerId="ADAL" clId="{25945966-4CA9-44E9-9F7D-5F3FE70B2F81}" dt="2021-03-22T18:54:57.101" v="317" actId="478"/>
+          <ac:picMkLst>
+            <pc:docMk/>
+            <pc:sldMk cId="1728512294" sldId="265"/>
+            <ac:picMk id="4" creationId="{523D24F9-53C9-4BD1-9719-9EA6DA2455CD}"/>
+          </ac:picMkLst>
+        </pc:picChg>
+      </pc:sldChg>
+      <pc:sldChg chg="modSp">
+        <pc:chgData name="Sven Wientjes" userId="7d731600-f613-4231-8242-4cc0fb25728d" providerId="ADAL" clId="{25945966-4CA9-44E9-9F7D-5F3FE70B2F81}" dt="2021-03-22T16:42:24.017" v="313" actId="20577"/>
+        <pc:sldMkLst>
+          <pc:docMk/>
+          <pc:sldMk cId="166385645" sldId="285"/>
+        </pc:sldMkLst>
+        <pc:spChg chg="mod">
+          <ac:chgData name="Sven Wientjes" userId="7d731600-f613-4231-8242-4cc0fb25728d" providerId="ADAL" clId="{25945966-4CA9-44E9-9F7D-5F3FE70B2F81}" dt="2021-03-22T16:42:24.017" v="313" actId="20577"/>
+          <ac:spMkLst>
+            <pc:docMk/>
+            <pc:sldMk cId="166385645" sldId="285"/>
+            <ac:spMk id="3" creationId="{9DBD7057-461A-4CA8-8E4F-423D8AE0EFAF}"/>
+          </ac:spMkLst>
+        </pc:spChg>
+      </pc:sldChg>
+      <pc:sldChg chg="modSp mod">
+        <pc:chgData name="Sven Wientjes" userId="7d731600-f613-4231-8242-4cc0fb25728d" providerId="ADAL" clId="{25945966-4CA9-44E9-9F7D-5F3FE70B2F81}" dt="2021-03-22T19:07:28.858" v="414" actId="20577"/>
+        <pc:sldMkLst>
+          <pc:docMk/>
+          <pc:sldMk cId="2391209520" sldId="287"/>
+        </pc:sldMkLst>
+        <pc:spChg chg="mod">
+          <ac:chgData name="Sven Wientjes" userId="7d731600-f613-4231-8242-4cc0fb25728d" providerId="ADAL" clId="{25945966-4CA9-44E9-9F7D-5F3FE70B2F81}" dt="2021-03-22T19:07:28.858" v="414" actId="20577"/>
+          <ac:spMkLst>
+            <pc:docMk/>
+            <pc:sldMk cId="2391209520" sldId="287"/>
+            <ac:spMk id="3" creationId="{F31B101F-2E0C-4594-8CCE-8C42E6F03C79}"/>
+          </ac:spMkLst>
+        </pc:spChg>
+      </pc:sldChg>
+      <pc:sldChg chg="modAnim">
+        <pc:chgData name="Sven Wientjes" userId="7d731600-f613-4231-8242-4cc0fb25728d" providerId="ADAL" clId="{25945966-4CA9-44E9-9F7D-5F3FE70B2F81}" dt="2021-03-22T16:48:36.431" v="314"/>
+        <pc:sldMkLst>
+          <pc:docMk/>
+          <pc:sldMk cId="2341941704" sldId="290"/>
+        </pc:sldMkLst>
+      </pc:sldChg>
+      <pc:sldChg chg="modAnim">
+        <pc:chgData name="Sven Wientjes" userId="7d731600-f613-4231-8242-4cc0fb25728d" providerId="ADAL" clId="{25945966-4CA9-44E9-9F7D-5F3FE70B2F81}" dt="2021-03-22T16:48:46.081" v="315"/>
+        <pc:sldMkLst>
+          <pc:docMk/>
+          <pc:sldMk cId="4170585177" sldId="292"/>
+        </pc:sldMkLst>
+      </pc:sldChg>
+      <pc:sldChg chg="addSp modSp mod modAnim">
+        <pc:chgData name="Sven Wientjes" userId="7d731600-f613-4231-8242-4cc0fb25728d" providerId="ADAL" clId="{25945966-4CA9-44E9-9F7D-5F3FE70B2F81}" dt="2021-03-22T19:07:33.999" v="416" actId="20577"/>
+        <pc:sldMkLst>
+          <pc:docMk/>
+          <pc:sldMk cId="2956637924" sldId="293"/>
+        </pc:sldMkLst>
+        <pc:spChg chg="mod">
+          <ac:chgData name="Sven Wientjes" userId="7d731600-f613-4231-8242-4cc0fb25728d" providerId="ADAL" clId="{25945966-4CA9-44E9-9F7D-5F3FE70B2F81}" dt="2021-03-22T19:07:33.999" v="416" actId="20577"/>
+          <ac:spMkLst>
+            <pc:docMk/>
+            <pc:sldMk cId="2956637924" sldId="293"/>
+            <ac:spMk id="16" creationId="{CCB03C30-2FD0-4D5A-9D19-A4945B1030EE}"/>
+          </ac:spMkLst>
+        </pc:spChg>
+        <pc:spChg chg="ord">
+          <ac:chgData name="Sven Wientjes" userId="7d731600-f613-4231-8242-4cc0fb25728d" providerId="ADAL" clId="{25945966-4CA9-44E9-9F7D-5F3FE70B2F81}" dt="2021-03-22T19:06:48.150" v="409" actId="166"/>
+          <ac:spMkLst>
+            <pc:docMk/>
+            <pc:sldMk cId="2956637924" sldId="293"/>
+            <ac:spMk id="18" creationId="{CB01C7D7-6D36-4109-8B21-A18177180D21}"/>
+          </ac:spMkLst>
+        </pc:spChg>
+        <pc:spChg chg="ord">
+          <ac:chgData name="Sven Wientjes" userId="7d731600-f613-4231-8242-4cc0fb25728d" providerId="ADAL" clId="{25945966-4CA9-44E9-9F7D-5F3FE70B2F81}" dt="2021-03-22T19:06:45.170" v="408" actId="166"/>
+          <ac:spMkLst>
+            <pc:docMk/>
+            <pc:sldMk cId="2956637924" sldId="293"/>
+            <ac:spMk id="19" creationId="{881F5FA2-422A-4BED-AE46-CD3C214D9AFC}"/>
+          </ac:spMkLst>
+        </pc:spChg>
+        <pc:picChg chg="add mod">
+          <ac:chgData name="Sven Wientjes" userId="7d731600-f613-4231-8242-4cc0fb25728d" providerId="ADAL" clId="{25945966-4CA9-44E9-9F7D-5F3FE70B2F81}" dt="2021-03-22T19:06:54.441" v="410" actId="1076"/>
+          <ac:picMkLst>
+            <pc:docMk/>
+            <pc:sldMk cId="2956637924" sldId="293"/>
+            <ac:picMk id="3" creationId="{0A4993BD-FFD7-4CB6-B944-1A02B8896FCA}"/>
+          </ac:picMkLst>
+        </pc:picChg>
+      </pc:sldChg>
+      <pc:sldChg chg="modSp new mod">
+        <pc:chgData name="Sven Wientjes" userId="7d731600-f613-4231-8242-4cc0fb25728d" providerId="ADAL" clId="{25945966-4CA9-44E9-9F7D-5F3FE70B2F81}" dt="2021-03-22T12:08:19.336" v="19" actId="313"/>
+        <pc:sldMkLst>
+          <pc:docMk/>
+          <pc:sldMk cId="902640810" sldId="294"/>
+        </pc:sldMkLst>
+        <pc:spChg chg="mod">
+          <ac:chgData name="Sven Wientjes" userId="7d731600-f613-4231-8242-4cc0fb25728d" providerId="ADAL" clId="{25945966-4CA9-44E9-9F7D-5F3FE70B2F81}" dt="2021-03-22T12:08:19.336" v="19" actId="313"/>
+          <ac:spMkLst>
+            <pc:docMk/>
+            <pc:sldMk cId="902640810" sldId="294"/>
+            <ac:spMk id="3" creationId="{270DCA83-7210-47F0-A013-633DF09E100A}"/>
+          </ac:spMkLst>
+        </pc:spChg>
+      </pc:sldChg>
+      <pc:sldChg chg="modSp new mod modAnim">
+        <pc:chgData name="Sven Wientjes" userId="7d731600-f613-4231-8242-4cc0fb25728d" providerId="ADAL" clId="{25945966-4CA9-44E9-9F7D-5F3FE70B2F81}" dt="2021-03-22T16:07:27.852" v="275"/>
+        <pc:sldMkLst>
+          <pc:docMk/>
+          <pc:sldMk cId="222546525" sldId="295"/>
+        </pc:sldMkLst>
+        <pc:spChg chg="mod">
+          <ac:chgData name="Sven Wientjes" userId="7d731600-f613-4231-8242-4cc0fb25728d" providerId="ADAL" clId="{25945966-4CA9-44E9-9F7D-5F3FE70B2F81}" dt="2021-03-22T16:06:04.285" v="31" actId="20577"/>
+          <ac:spMkLst>
+            <pc:docMk/>
+            <pc:sldMk cId="222546525" sldId="295"/>
+            <ac:spMk id="2" creationId="{E80C4EE1-5298-4D22-915B-3F34254BA81E}"/>
+          </ac:spMkLst>
+        </pc:spChg>
+        <pc:spChg chg="mod">
+          <ac:chgData name="Sven Wientjes" userId="7d731600-f613-4231-8242-4cc0fb25728d" providerId="ADAL" clId="{25945966-4CA9-44E9-9F7D-5F3FE70B2F81}" dt="2021-03-22T16:07:01.827" v="273" actId="20577"/>
+          <ac:spMkLst>
+            <pc:docMk/>
+            <pc:sldMk cId="222546525" sldId="295"/>
+            <ac:spMk id="3" creationId="{F070580A-C032-491B-A46F-605419A206B7}"/>
+          </ac:spMkLst>
+        </pc:spChg>
+      </pc:sldChg>
+      <pc:sldChg chg="new del">
+        <pc:chgData name="Sven Wientjes" userId="7d731600-f613-4231-8242-4cc0fb25728d" providerId="ADAL" clId="{25945966-4CA9-44E9-9F7D-5F3FE70B2F81}" dt="2021-03-22T12:08:08.822" v="4" actId="47"/>
+        <pc:sldMkLst>
+          <pc:docMk/>
+          <pc:sldMk cId="422393525" sldId="295"/>
+        </pc:sldMkLst>
+      </pc:sldChg>
+      <pc:sldChg chg="addSp delSp modSp new del mod delAnim modAnim">
+        <pc:chgData name="Sven Wientjes" userId="7d731600-f613-4231-8242-4cc0fb25728d" providerId="ADAL" clId="{25945966-4CA9-44E9-9F7D-5F3FE70B2F81}" dt="2021-03-22T21:22:12.364" v="417" actId="47"/>
+        <pc:sldMkLst>
+          <pc:docMk/>
+          <pc:sldMk cId="2152725104" sldId="296"/>
+        </pc:sldMkLst>
+        <pc:spChg chg="mod">
+          <ac:chgData name="Sven Wientjes" userId="7d731600-f613-4231-8242-4cc0fb25728d" providerId="ADAL" clId="{25945966-4CA9-44E9-9F7D-5F3FE70B2F81}" dt="2021-03-22T18:57:31.430" v="331" actId="20577"/>
+          <ac:spMkLst>
+            <pc:docMk/>
+            <pc:sldMk cId="2152725104" sldId="296"/>
+            <ac:spMk id="2" creationId="{B2FB4490-9E72-4090-90CF-2FB70A141CD6}"/>
+          </ac:spMkLst>
+        </pc:spChg>
+        <pc:spChg chg="mod">
+          <ac:chgData name="Sven Wientjes" userId="7d731600-f613-4231-8242-4cc0fb25728d" providerId="ADAL" clId="{25945966-4CA9-44E9-9F7D-5F3FE70B2F81}" dt="2021-03-22T18:57:36.257" v="361" actId="20577"/>
+          <ac:spMkLst>
+            <pc:docMk/>
+            <pc:sldMk cId="2152725104" sldId="296"/>
+            <ac:spMk id="3" creationId="{73F4D260-0ED0-4A9D-9AC7-F36A59C2F0EF}"/>
+          </ac:spMkLst>
+        </pc:spChg>
+        <pc:spChg chg="add del mod">
+          <ac:chgData name="Sven Wientjes" userId="7d731600-f613-4231-8242-4cc0fb25728d" providerId="ADAL" clId="{25945966-4CA9-44E9-9F7D-5F3FE70B2F81}" dt="2021-03-22T19:01:00.201" v="399" actId="478"/>
+          <ac:spMkLst>
+            <pc:docMk/>
+            <pc:sldMk cId="2152725104" sldId="296"/>
+            <ac:spMk id="6" creationId="{98EFEEC3-3416-4A97-A32C-D242B1A8A4B7}"/>
+          </ac:spMkLst>
+        </pc:spChg>
+        <pc:picChg chg="add del mod">
+          <ac:chgData name="Sven Wientjes" userId="7d731600-f613-4231-8242-4cc0fb25728d" providerId="ADAL" clId="{25945966-4CA9-44E9-9F7D-5F3FE70B2F81}" dt="2021-03-22T19:00:58.723" v="398" actId="478"/>
+          <ac:picMkLst>
+            <pc:docMk/>
+            <pc:sldMk cId="2152725104" sldId="296"/>
+            <ac:picMk id="5" creationId="{6EBB4495-0F25-48E7-8405-53E95157F9E3}"/>
+          </ac:picMkLst>
+        </pc:picChg>
+      </pc:sldChg>
+      <pc:sldChg chg="addSp delSp modSp new mod modAnim">
+        <pc:chgData name="Sven Wientjes" userId="7d731600-f613-4231-8242-4cc0fb25728d" providerId="ADAL" clId="{25945966-4CA9-44E9-9F7D-5F3FE70B2F81}" dt="2021-03-23T12:41:25.297" v="466"/>
+        <pc:sldMkLst>
+          <pc:docMk/>
+          <pc:sldMk cId="2851205402" sldId="296"/>
+        </pc:sldMkLst>
+        <pc:spChg chg="mod">
+          <ac:chgData name="Sven Wientjes" userId="7d731600-f613-4231-8242-4cc0fb25728d" providerId="ADAL" clId="{25945966-4CA9-44E9-9F7D-5F3FE70B2F81}" dt="2021-03-23T12:40:29.059" v="447" actId="20577"/>
+          <ac:spMkLst>
+            <pc:docMk/>
+            <pc:sldMk cId="2851205402" sldId="296"/>
+            <ac:spMk id="2" creationId="{C6A6D532-C35F-4BA0-B797-801888F8788F}"/>
+          </ac:spMkLst>
+        </pc:spChg>
+        <pc:spChg chg="add del mod">
+          <ac:chgData name="Sven Wientjes" userId="7d731600-f613-4231-8242-4cc0fb25728d" providerId="ADAL" clId="{25945966-4CA9-44E9-9F7D-5F3FE70B2F81}" dt="2021-03-23T12:41:15.788" v="465" actId="20577"/>
+          <ac:spMkLst>
+            <pc:docMk/>
+            <pc:sldMk cId="2851205402" sldId="296"/>
+            <ac:spMk id="3" creationId="{7F4D8D24-3E4C-472E-A768-55208F416529}"/>
+          </ac:spMkLst>
+        </pc:spChg>
+        <pc:spChg chg="add mod">
+          <ac:chgData name="Sven Wientjes" userId="7d731600-f613-4231-8242-4cc0fb25728d" providerId="ADAL" clId="{25945966-4CA9-44E9-9F7D-5F3FE70B2F81}" dt="2021-03-23T12:40:30.947" v="448"/>
+          <ac:spMkLst>
+            <pc:docMk/>
+            <pc:sldMk cId="2851205402" sldId="296"/>
+            <ac:spMk id="6" creationId="{5ADD4388-1CE0-44E6-987C-A5DD665D62DD}"/>
+          </ac:spMkLst>
+        </pc:spChg>
+        <pc:picChg chg="add mod">
+          <ac:chgData name="Sven Wientjes" userId="7d731600-f613-4231-8242-4cc0fb25728d" providerId="ADAL" clId="{25945966-4CA9-44E9-9F7D-5F3FE70B2F81}" dt="2021-03-23T12:40:30.947" v="448"/>
+          <ac:picMkLst>
+            <pc:docMk/>
+            <pc:sldMk cId="2851205402" sldId="296"/>
+            <ac:picMk id="5" creationId="{8E552282-2E96-4719-BC63-64494F35BA7B}"/>
+          </ac:picMkLst>
+        </pc:picChg>
+        <pc:picChg chg="add mod">
+          <ac:chgData name="Sven Wientjes" userId="7d731600-f613-4231-8242-4cc0fb25728d" providerId="ADAL" clId="{25945966-4CA9-44E9-9F7D-5F3FE70B2F81}" dt="2021-03-23T12:40:30.947" v="448"/>
+          <ac:picMkLst>
+            <pc:docMk/>
+            <pc:sldMk cId="2851205402" sldId="296"/>
+            <ac:picMk id="7" creationId="{23866B52-A5C2-4823-BBFF-6787435E7B7C}"/>
+          </ac:picMkLst>
+        </pc:picChg>
+      </pc:sldChg>
+    </pc:docChg>
+  </pc:docChgLst>
   <pc:docChgLst>
     <pc:chgData name="Sven" userId="7d731600-f613-4231-8242-4cc0fb25728d" providerId="ADAL" clId="{25945966-4CA9-44E9-9F7D-5F3FE70B2F81}"/>
     <pc:docChg chg="undo custSel addSld delSld modSld sldOrd">
@@ -1175,7 +1416,7 @@
           <a:p>
             <a:fld id="{86680C0C-85DF-417F-8238-DB0D15743621}" type="datetimeFigureOut">
               <a:rPr lang="en-GB" smtClean="0"/>
-              <a:t>22/03/2021</a:t>
+              <a:t>23/03/2021</a:t>
             </a:fld>
             <a:endParaRPr lang="en-GB"/>
           </a:p>
@@ -1477,7 +1718,7 @@
           <a:p>
             <a:fld id="{50464F84-246C-4657-8172-1E2969D0F603}" type="datetime1">
               <a:rPr lang="en-GB" smtClean="0"/>
-              <a:t>22/03/2021</a:t>
+              <a:t>23/03/2021</a:t>
             </a:fld>
             <a:endParaRPr lang="en-GB"/>
           </a:p>
@@ -2669,7 +2910,7 @@
           <a:p>
             <a:fld id="{4FCCCAF6-1686-4743-9124-83F33F1A0EA9}" type="datetime1">
               <a:rPr lang="en-GB" noProof="0" smtClean="0"/>
-              <a:t>22/03/2021</a:t>
+              <a:t>23/03/2021</a:t>
             </a:fld>
             <a:endParaRPr lang="en-GB" noProof="0" dirty="0"/>
           </a:p>
@@ -2787,7 +3028,7 @@
           <a:p>
             <a:fld id="{B86ADBF0-A618-4E69-83BB-0C41E08702AA}" type="datetime1">
               <a:rPr lang="en-GB" noProof="0" smtClean="0"/>
-              <a:t>22/03/2021</a:t>
+              <a:t>23/03/2021</a:t>
             </a:fld>
             <a:endParaRPr lang="en-GB" noProof="0" dirty="0"/>
           </a:p>
@@ -3047,7 +3288,7 @@
           <a:p>
             <a:fld id="{F2443E58-CDC3-4782-B82C-4D381C795B98}" type="datetime1">
               <a:rPr lang="en-GB" noProof="0" smtClean="0"/>
-              <a:t>22/03/2021</a:t>
+              <a:t>23/03/2021</a:t>
             </a:fld>
             <a:endParaRPr lang="en-GB" noProof="0" dirty="0"/>
           </a:p>
@@ -3187,7 +3428,7 @@
           <a:p>
             <a:fld id="{3D3465D1-804F-429B-83CD-3EFA8410E123}" type="datetime1">
               <a:rPr lang="en-GB" smtClean="0"/>
-              <a:t>22/03/2021</a:t>
+              <a:t>23/03/2021</a:t>
             </a:fld>
             <a:endParaRPr lang="en-GB"/>
           </a:p>
@@ -3386,7 +3627,7 @@
           <a:p>
             <a:fld id="{66A81384-1200-4D40-BEF0-3A17A1F906F4}" type="datetime1">
               <a:rPr lang="nl-NL" noProof="0" smtClean="0"/>
-              <a:t>22-3-2021</a:t>
+              <a:t>23-3-2021</a:t>
             </a:fld>
             <a:endParaRPr lang="nl-NL" noProof="0" dirty="0"/>
           </a:p>
@@ -3631,7 +3872,7 @@
           <a:p>
             <a:fld id="{66A81384-1200-4D40-BEF0-3A17A1F906F4}" type="datetime1">
               <a:rPr lang="nl-NL" noProof="0" smtClean="0"/>
-              <a:t>22-3-2021</a:t>
+              <a:t>23-3-2021</a:t>
             </a:fld>
             <a:endParaRPr lang="nl-NL" noProof="0" dirty="0"/>
           </a:p>
@@ -3901,7 +4142,7 @@
           <a:p>
             <a:fld id="{434BA3CA-1064-434F-B179-AB3B0298C0D6}" type="datetime1">
               <a:rPr lang="en-GB" noProof="0" smtClean="0"/>
-              <a:t>22/03/2021</a:t>
+              <a:t>23/03/2021</a:t>
             </a:fld>
             <a:endParaRPr lang="en-GB" noProof="0" dirty="0"/>
           </a:p>
@@ -4723,6 +4964,808 @@
           <a:chExt cx="0" cy="0"/>
         </a:xfrm>
       </p:grpSpPr>
+      <p:sp>
+        <p:nvSpPr>
+          <p:cNvPr id="2" name="Picture Placeholder 1">
+            <a:extLst>
+              <a:ext uri="{FF2B5EF4-FFF2-40B4-BE49-F238E27FC236}">
+                <a16:creationId xmlns:a16="http://schemas.microsoft.com/office/drawing/2014/main" id="{8ECEC344-801B-405D-86DB-B66A08C335EB}"/>
+              </a:ext>
+            </a:extLst>
+          </p:cNvPr>
+          <p:cNvSpPr>
+            <a:spLocks noGrp="1"/>
+          </p:cNvSpPr>
+          <p:nvPr>
+            <p:ph type="pic" sz="quarter" idx="12"/>
+          </p:nvPr>
+        </p:nvSpPr>
+        <p:spPr/>
+      </p:sp>
+      <p:sp>
+        <p:nvSpPr>
+          <p:cNvPr id="3" name="Text Placeholder 2">
+            <a:extLst>
+              <a:ext uri="{FF2B5EF4-FFF2-40B4-BE49-F238E27FC236}">
+                <a16:creationId xmlns:a16="http://schemas.microsoft.com/office/drawing/2014/main" id="{0311A150-355A-4F1C-9639-2564A971BF07}"/>
+              </a:ext>
+            </a:extLst>
+          </p:cNvPr>
+          <p:cNvSpPr>
+            <a:spLocks noGrp="1"/>
+          </p:cNvSpPr>
+          <p:nvPr>
+            <p:ph type="body" sz="quarter" idx="13"/>
+          </p:nvPr>
+        </p:nvSpPr>
+        <p:spPr/>
+        <p:txBody>
+          <a:bodyPr/>
+          <a:lstStyle/>
+          <a:p>
+            <a:r>
+              <a:rPr lang="en-US" dirty="0"/>
+              <a:t>New Task</a:t>
+            </a:r>
+            <a:endParaRPr lang="en-GB" dirty="0"/>
+          </a:p>
+        </p:txBody>
+      </p:sp>
+    </p:spTree>
+    <p:extLst>
+      <p:ext uri="{BB962C8B-B14F-4D97-AF65-F5344CB8AC3E}">
+        <p14:creationId xmlns:p14="http://schemas.microsoft.com/office/powerpoint/2010/main" val="4258186519"/>
+      </p:ext>
+    </p:extLst>
+  </p:cSld>
+  <p:clrMapOvr>
+    <a:masterClrMapping/>
+  </p:clrMapOvr>
+</p:sld>
+</file>
+
+<file path=ppt/slides/slide11.xml><?xml version="1.0" encoding="utf-8"?>
+<p:sld xmlns:a="http://schemas.openxmlformats.org/drawingml/2006/main" xmlns:r="http://schemas.openxmlformats.org/officeDocument/2006/relationships" xmlns:p="http://schemas.openxmlformats.org/presentationml/2006/main">
+  <p:cSld>
+    <p:spTree>
+      <p:nvGrpSpPr>
+        <p:cNvPr id="1" name=""/>
+        <p:cNvGrpSpPr/>
+        <p:nvPr/>
+      </p:nvGrpSpPr>
+      <p:grpSpPr>
+        <a:xfrm>
+          <a:off x="0" y="0"/>
+          <a:ext cx="0" cy="0"/>
+          <a:chOff x="0" y="0"/>
+          <a:chExt cx="0" cy="0"/>
+        </a:xfrm>
+      </p:grpSpPr>
+      <p:sp>
+        <p:nvSpPr>
+          <p:cNvPr id="2" name="Title 1">
+            <a:extLst>
+              <a:ext uri="{FF2B5EF4-FFF2-40B4-BE49-F238E27FC236}">
+                <a16:creationId xmlns:a16="http://schemas.microsoft.com/office/drawing/2014/main" id="{419414DF-20DA-4104-827D-FB22F577D4B8}"/>
+              </a:ext>
+            </a:extLst>
+          </p:cNvPr>
+          <p:cNvSpPr>
+            <a:spLocks noGrp="1"/>
+          </p:cNvSpPr>
+          <p:nvPr>
+            <p:ph type="title"/>
+          </p:nvPr>
+        </p:nvSpPr>
+        <p:spPr/>
+        <p:txBody>
+          <a:bodyPr/>
+          <a:lstStyle/>
+          <a:p>
+            <a:r>
+              <a:rPr lang="en-US" dirty="0"/>
+              <a:t>Online pilot</a:t>
+            </a:r>
+            <a:endParaRPr lang="en-GB" dirty="0"/>
+          </a:p>
+        </p:txBody>
+      </p:sp>
+      <p:sp>
+        <p:nvSpPr>
+          <p:cNvPr id="3" name="Content Placeholder 2">
+            <a:extLst>
+              <a:ext uri="{FF2B5EF4-FFF2-40B4-BE49-F238E27FC236}">
+                <a16:creationId xmlns:a16="http://schemas.microsoft.com/office/drawing/2014/main" id="{AF18B125-670D-4BCE-89CA-D5A9A14567DB}"/>
+              </a:ext>
+            </a:extLst>
+          </p:cNvPr>
+          <p:cNvSpPr>
+            <a:spLocks noGrp="1"/>
+          </p:cNvSpPr>
+          <p:nvPr>
+            <p:ph idx="1"/>
+          </p:nvPr>
+        </p:nvSpPr>
+        <p:spPr/>
+        <p:txBody>
+          <a:bodyPr/>
+          <a:lstStyle/>
+          <a:p>
+            <a:r>
+              <a:rPr lang="en-US" dirty="0" err="1"/>
+              <a:t>Behavioural</a:t>
+            </a:r>
+            <a:r>
+              <a:rPr lang="en-US" dirty="0"/>
+              <a:t> task / learning</a:t>
+            </a:r>
+            <a:endParaRPr lang="en-GB" dirty="0"/>
+          </a:p>
+        </p:txBody>
+      </p:sp>
+      <p:sp>
+        <p:nvSpPr>
+          <p:cNvPr id="4" name="Slide Number Placeholder 3">
+            <a:extLst>
+              <a:ext uri="{FF2B5EF4-FFF2-40B4-BE49-F238E27FC236}">
+                <a16:creationId xmlns:a16="http://schemas.microsoft.com/office/drawing/2014/main" id="{DD878199-45CF-47A6-A052-93F90E40CF0C}"/>
+              </a:ext>
+            </a:extLst>
+          </p:cNvPr>
+          <p:cNvSpPr>
+            <a:spLocks noGrp="1"/>
+          </p:cNvSpPr>
+          <p:nvPr>
+            <p:ph type="sldNum" sz="quarter" idx="12"/>
+          </p:nvPr>
+        </p:nvSpPr>
+        <p:spPr/>
+        <p:txBody>
+          <a:bodyPr/>
+          <a:lstStyle/>
+          <a:p>
+            <a:fld id="{7AE184E0-0BD4-4705-A12B-9B71DDE63301}" type="slidenum">
+              <a:rPr lang="en-GB" noProof="0" smtClean="0"/>
+              <a:t>11</a:t>
+            </a:fld>
+            <a:endParaRPr lang="en-GB" noProof="0" dirty="0"/>
+          </a:p>
+        </p:txBody>
+      </p:sp>
+      <p:pic>
+        <p:nvPicPr>
+          <p:cNvPr id="8" name="Graphic 7">
+            <a:extLst>
+              <a:ext uri="{FF2B5EF4-FFF2-40B4-BE49-F238E27FC236}">
+                <a16:creationId xmlns:a16="http://schemas.microsoft.com/office/drawing/2014/main" id="{A3CEF66E-BA22-4261-892A-8B3CEA3AD98D}"/>
+              </a:ext>
+            </a:extLst>
+          </p:cNvPr>
+          <p:cNvPicPr>
+            <a:picLocks noChangeAspect="1"/>
+          </p:cNvPicPr>
+          <p:nvPr/>
+        </p:nvPicPr>
+        <p:blipFill>
+          <a:blip r:embed="rId2">
+            <a:extLst>
+              <a:ext uri="{28A0092B-C50C-407E-A947-70E740481C1C}">
+                <a14:useLocalDpi xmlns:a14="http://schemas.microsoft.com/office/drawing/2010/main" val="0"/>
+              </a:ext>
+              <a:ext uri="{96DAC541-7B7A-43D3-8B79-37D633B846F1}">
+                <asvg:svgBlip xmlns:asvg="http://schemas.microsoft.com/office/drawing/2016/SVG/main" r:embed="rId3"/>
+              </a:ext>
+            </a:extLst>
+          </a:blip>
+          <a:stretch>
+            <a:fillRect/>
+          </a:stretch>
+        </p:blipFill>
+        <p:spPr>
+          <a:xfrm>
+            <a:off x="830118" y="2137559"/>
+            <a:ext cx="5752806" cy="5752806"/>
+          </a:xfrm>
+          <a:prstGeom prst="rect">
+            <a:avLst/>
+          </a:prstGeom>
+        </p:spPr>
+      </p:pic>
+      <p:sp>
+        <p:nvSpPr>
+          <p:cNvPr id="9" name="TextBox 8">
+            <a:extLst>
+              <a:ext uri="{FF2B5EF4-FFF2-40B4-BE49-F238E27FC236}">
+                <a16:creationId xmlns:a16="http://schemas.microsoft.com/office/drawing/2014/main" id="{F01FBE16-D860-4653-9508-CBED61FE22B5}"/>
+              </a:ext>
+            </a:extLst>
+          </p:cNvPr>
+          <p:cNvSpPr txBox="1"/>
+          <p:nvPr/>
+        </p:nvSpPr>
+        <p:spPr>
+          <a:xfrm>
+            <a:off x="8122722" y="2743200"/>
+            <a:ext cx="5296395" cy="973280"/>
+          </a:xfrm>
+          <a:prstGeom prst="rect">
+            <a:avLst/>
+          </a:prstGeom>
+          <a:noFill/>
+        </p:spPr>
+        <p:txBody>
+          <a:bodyPr wrap="square" rtlCol="0">
+            <a:spAutoFit/>
+          </a:bodyPr>
+          <a:lstStyle/>
+          <a:p>
+            <a:pPr marL="342900" indent="-342900" algn="l">
+              <a:lnSpc>
+                <a:spcPct val="120000"/>
+              </a:lnSpc>
+              <a:buFont typeface="Arial" panose="020B0604020202020204" pitchFamily="34" charset="0"/>
+              <a:buChar char="‒"/>
+            </a:pPr>
+            <a:r>
+              <a:rPr lang="en-US" sz="2500" dirty="0"/>
+              <a:t>Starting positions</a:t>
+            </a:r>
+          </a:p>
+          <a:p>
+            <a:pPr marL="342900" indent="-342900" algn="l">
+              <a:lnSpc>
+                <a:spcPct val="120000"/>
+              </a:lnSpc>
+              <a:buFont typeface="Arial" panose="020B0604020202020204" pitchFamily="34" charset="0"/>
+              <a:buChar char="‒"/>
+            </a:pPr>
+            <a:r>
+              <a:rPr lang="en-US" sz="2500" dirty="0"/>
+              <a:t>Goal positions</a:t>
+            </a:r>
+          </a:p>
+        </p:txBody>
+      </p:sp>
+      <p:sp>
+        <p:nvSpPr>
+          <p:cNvPr id="10" name="TextBox 9">
+            <a:extLst>
+              <a:ext uri="{FF2B5EF4-FFF2-40B4-BE49-F238E27FC236}">
+                <a16:creationId xmlns:a16="http://schemas.microsoft.com/office/drawing/2014/main" id="{D54124C3-436E-4280-BD38-EF55626FF297}"/>
+              </a:ext>
+            </a:extLst>
+          </p:cNvPr>
+          <p:cNvSpPr txBox="1"/>
+          <p:nvPr/>
+        </p:nvSpPr>
+        <p:spPr>
+          <a:xfrm>
+            <a:off x="8122722" y="4718480"/>
+            <a:ext cx="4358244" cy="1434945"/>
+          </a:xfrm>
+          <a:prstGeom prst="rect">
+            <a:avLst/>
+          </a:prstGeom>
+          <a:noFill/>
+        </p:spPr>
+        <p:txBody>
+          <a:bodyPr wrap="square" rtlCol="0">
+            <a:spAutoFit/>
+          </a:bodyPr>
+          <a:lstStyle/>
+          <a:p>
+            <a:pPr marL="342900" indent="-342900" algn="l">
+              <a:lnSpc>
+                <a:spcPct val="120000"/>
+              </a:lnSpc>
+              <a:buFont typeface="Arial" panose="020B0604020202020204" pitchFamily="34" charset="0"/>
+              <a:buChar char="‒"/>
+            </a:pPr>
+            <a:r>
+              <a:rPr lang="en-US" sz="2500" dirty="0"/>
+              <a:t>Points</a:t>
+            </a:r>
+          </a:p>
+          <a:p>
+            <a:pPr marL="342900" indent="-342900" algn="l">
+              <a:lnSpc>
+                <a:spcPct val="120000"/>
+              </a:lnSpc>
+              <a:buFont typeface="Arial" panose="020B0604020202020204" pitchFamily="34" charset="0"/>
+              <a:buChar char="‒"/>
+            </a:pPr>
+            <a:r>
+              <a:rPr lang="en-US" sz="2500" dirty="0"/>
+              <a:t>15 Steps</a:t>
+            </a:r>
+          </a:p>
+          <a:p>
+            <a:pPr marL="342900" indent="-342900" algn="l">
+              <a:lnSpc>
+                <a:spcPct val="120000"/>
+              </a:lnSpc>
+              <a:buFont typeface="Arial" panose="020B0604020202020204" pitchFamily="34" charset="0"/>
+              <a:buChar char="‒"/>
+            </a:pPr>
+            <a:r>
+              <a:rPr lang="en-US" sz="2500" dirty="0"/>
+              <a:t>Differing policies</a:t>
+            </a:r>
+            <a:endParaRPr lang="en-GB" sz="2500" dirty="0"/>
+          </a:p>
+        </p:txBody>
+      </p:sp>
+    </p:spTree>
+    <p:extLst>
+      <p:ext uri="{BB962C8B-B14F-4D97-AF65-F5344CB8AC3E}">
+        <p14:creationId xmlns:p14="http://schemas.microsoft.com/office/powerpoint/2010/main" val="2561075111"/>
+      </p:ext>
+    </p:extLst>
+  </p:cSld>
+  <p:clrMapOvr>
+    <a:masterClrMapping/>
+  </p:clrMapOvr>
+  <p:timing>
+    <p:tnLst>
+      <p:par>
+        <p:cTn id="1" dur="indefinite" restart="never" nodeType="tmRoot">
+          <p:childTnLst>
+            <p:seq concurrent="1" nextAc="seek">
+              <p:cTn id="2" dur="indefinite" nodeType="mainSeq">
+                <p:childTnLst>
+                  <p:par>
+                    <p:cTn id="3" fill="hold">
+                      <p:stCondLst>
+                        <p:cond delay="indefinite"/>
+                      </p:stCondLst>
+                      <p:childTnLst>
+                        <p:par>
+                          <p:cTn id="4" fill="hold">
+                            <p:stCondLst>
+                              <p:cond delay="0"/>
+                            </p:stCondLst>
+                            <p:childTnLst>
+                              <p:par>
+                                <p:cTn id="5" presetID="1" presetClass="entr" presetSubtype="0" fill="hold" nodeType="clickEffect">
+                                  <p:stCondLst>
+                                    <p:cond delay="0"/>
+                                  </p:stCondLst>
+                                  <p:childTnLst>
+                                    <p:set>
+                                      <p:cBhvr>
+                                        <p:cTn id="6" dur="1" fill="hold">
+                                          <p:stCondLst>
+                                            <p:cond delay="0"/>
+                                          </p:stCondLst>
+                                        </p:cTn>
+                                        <p:tgtEl>
+                                          <p:spTgt spid="8"/>
+                                        </p:tgtEl>
+                                        <p:attrNameLst>
+                                          <p:attrName>style.visibility</p:attrName>
+                                        </p:attrNameLst>
+                                      </p:cBhvr>
+                                      <p:to>
+                                        <p:strVal val="visible"/>
+                                      </p:to>
+                                    </p:set>
+                                  </p:childTnLst>
+                                </p:cTn>
+                              </p:par>
+                            </p:childTnLst>
+                          </p:cTn>
+                        </p:par>
+                      </p:childTnLst>
+                    </p:cTn>
+                  </p:par>
+                  <p:par>
+                    <p:cTn id="7" fill="hold">
+                      <p:stCondLst>
+                        <p:cond delay="indefinite"/>
+                      </p:stCondLst>
+                      <p:childTnLst>
+                        <p:par>
+                          <p:cTn id="8" fill="hold">
+                            <p:stCondLst>
+                              <p:cond delay="0"/>
+                            </p:stCondLst>
+                            <p:childTnLst>
+                              <p:par>
+                                <p:cTn id="9" presetID="1" presetClass="entr" presetSubtype="0" fill="hold" grpId="0" nodeType="clickEffect">
+                                  <p:stCondLst>
+                                    <p:cond delay="0"/>
+                                  </p:stCondLst>
+                                  <p:childTnLst>
+                                    <p:set>
+                                      <p:cBhvr>
+                                        <p:cTn id="10" dur="1" fill="hold">
+                                          <p:stCondLst>
+                                            <p:cond delay="0"/>
+                                          </p:stCondLst>
+                                        </p:cTn>
+                                        <p:tgtEl>
+                                          <p:spTgt spid="9">
+                                            <p:txEl>
+                                              <p:pRg st="0" end="0"/>
+                                            </p:txEl>
+                                          </p:spTgt>
+                                        </p:tgtEl>
+                                        <p:attrNameLst>
+                                          <p:attrName>style.visibility</p:attrName>
+                                        </p:attrNameLst>
+                                      </p:cBhvr>
+                                      <p:to>
+                                        <p:strVal val="visible"/>
+                                      </p:to>
+                                    </p:set>
+                                  </p:childTnLst>
+                                </p:cTn>
+                              </p:par>
+                            </p:childTnLst>
+                          </p:cTn>
+                        </p:par>
+                      </p:childTnLst>
+                    </p:cTn>
+                  </p:par>
+                  <p:par>
+                    <p:cTn id="11" fill="hold">
+                      <p:stCondLst>
+                        <p:cond delay="indefinite"/>
+                      </p:stCondLst>
+                      <p:childTnLst>
+                        <p:par>
+                          <p:cTn id="12" fill="hold">
+                            <p:stCondLst>
+                              <p:cond delay="0"/>
+                            </p:stCondLst>
+                            <p:childTnLst>
+                              <p:par>
+                                <p:cTn id="13" presetID="1" presetClass="entr" presetSubtype="0" fill="hold" grpId="0" nodeType="clickEffect">
+                                  <p:stCondLst>
+                                    <p:cond delay="0"/>
+                                  </p:stCondLst>
+                                  <p:childTnLst>
+                                    <p:set>
+                                      <p:cBhvr>
+                                        <p:cTn id="14" dur="1" fill="hold">
+                                          <p:stCondLst>
+                                            <p:cond delay="0"/>
+                                          </p:stCondLst>
+                                        </p:cTn>
+                                        <p:tgtEl>
+                                          <p:spTgt spid="9">
+                                            <p:txEl>
+                                              <p:pRg st="1" end="1"/>
+                                            </p:txEl>
+                                          </p:spTgt>
+                                        </p:tgtEl>
+                                        <p:attrNameLst>
+                                          <p:attrName>style.visibility</p:attrName>
+                                        </p:attrNameLst>
+                                      </p:cBhvr>
+                                      <p:to>
+                                        <p:strVal val="visible"/>
+                                      </p:to>
+                                    </p:set>
+                                  </p:childTnLst>
+                                </p:cTn>
+                              </p:par>
+                            </p:childTnLst>
+                          </p:cTn>
+                        </p:par>
+                      </p:childTnLst>
+                    </p:cTn>
+                  </p:par>
+                  <p:par>
+                    <p:cTn id="15" fill="hold">
+                      <p:stCondLst>
+                        <p:cond delay="indefinite"/>
+                      </p:stCondLst>
+                      <p:childTnLst>
+                        <p:par>
+                          <p:cTn id="16" fill="hold">
+                            <p:stCondLst>
+                              <p:cond delay="0"/>
+                            </p:stCondLst>
+                            <p:childTnLst>
+                              <p:par>
+                                <p:cTn id="17" presetID="1" presetClass="entr" presetSubtype="0" fill="hold" grpId="0" nodeType="clickEffect">
+                                  <p:stCondLst>
+                                    <p:cond delay="0"/>
+                                  </p:stCondLst>
+                                  <p:childTnLst>
+                                    <p:set>
+                                      <p:cBhvr>
+                                        <p:cTn id="18" dur="1" fill="hold">
+                                          <p:stCondLst>
+                                            <p:cond delay="0"/>
+                                          </p:stCondLst>
+                                        </p:cTn>
+                                        <p:tgtEl>
+                                          <p:spTgt spid="10">
+                                            <p:txEl>
+                                              <p:pRg st="0" end="0"/>
+                                            </p:txEl>
+                                          </p:spTgt>
+                                        </p:tgtEl>
+                                        <p:attrNameLst>
+                                          <p:attrName>style.visibility</p:attrName>
+                                        </p:attrNameLst>
+                                      </p:cBhvr>
+                                      <p:to>
+                                        <p:strVal val="visible"/>
+                                      </p:to>
+                                    </p:set>
+                                  </p:childTnLst>
+                                </p:cTn>
+                              </p:par>
+                            </p:childTnLst>
+                          </p:cTn>
+                        </p:par>
+                      </p:childTnLst>
+                    </p:cTn>
+                  </p:par>
+                  <p:par>
+                    <p:cTn id="19" fill="hold">
+                      <p:stCondLst>
+                        <p:cond delay="indefinite"/>
+                      </p:stCondLst>
+                      <p:childTnLst>
+                        <p:par>
+                          <p:cTn id="20" fill="hold">
+                            <p:stCondLst>
+                              <p:cond delay="0"/>
+                            </p:stCondLst>
+                            <p:childTnLst>
+                              <p:par>
+                                <p:cTn id="21" presetID="1" presetClass="entr" presetSubtype="0" fill="hold" grpId="0" nodeType="clickEffect">
+                                  <p:stCondLst>
+                                    <p:cond delay="0"/>
+                                  </p:stCondLst>
+                                  <p:childTnLst>
+                                    <p:set>
+                                      <p:cBhvr>
+                                        <p:cTn id="22" dur="1" fill="hold">
+                                          <p:stCondLst>
+                                            <p:cond delay="0"/>
+                                          </p:stCondLst>
+                                        </p:cTn>
+                                        <p:tgtEl>
+                                          <p:spTgt spid="10">
+                                            <p:txEl>
+                                              <p:pRg st="1" end="1"/>
+                                            </p:txEl>
+                                          </p:spTgt>
+                                        </p:tgtEl>
+                                        <p:attrNameLst>
+                                          <p:attrName>style.visibility</p:attrName>
+                                        </p:attrNameLst>
+                                      </p:cBhvr>
+                                      <p:to>
+                                        <p:strVal val="visible"/>
+                                      </p:to>
+                                    </p:set>
+                                  </p:childTnLst>
+                                </p:cTn>
+                              </p:par>
+                            </p:childTnLst>
+                          </p:cTn>
+                        </p:par>
+                      </p:childTnLst>
+                    </p:cTn>
+                  </p:par>
+                  <p:par>
+                    <p:cTn id="23" fill="hold">
+                      <p:stCondLst>
+                        <p:cond delay="indefinite"/>
+                      </p:stCondLst>
+                      <p:childTnLst>
+                        <p:par>
+                          <p:cTn id="24" fill="hold">
+                            <p:stCondLst>
+                              <p:cond delay="0"/>
+                            </p:stCondLst>
+                            <p:childTnLst>
+                              <p:par>
+                                <p:cTn id="25" presetID="1" presetClass="entr" presetSubtype="0" fill="hold" grpId="0" nodeType="clickEffect">
+                                  <p:stCondLst>
+                                    <p:cond delay="0"/>
+                                  </p:stCondLst>
+                                  <p:childTnLst>
+                                    <p:set>
+                                      <p:cBhvr>
+                                        <p:cTn id="26" dur="1" fill="hold">
+                                          <p:stCondLst>
+                                            <p:cond delay="0"/>
+                                          </p:stCondLst>
+                                        </p:cTn>
+                                        <p:tgtEl>
+                                          <p:spTgt spid="10">
+                                            <p:txEl>
+                                              <p:pRg st="2" end="2"/>
+                                            </p:txEl>
+                                          </p:spTgt>
+                                        </p:tgtEl>
+                                        <p:attrNameLst>
+                                          <p:attrName>style.visibility</p:attrName>
+                                        </p:attrNameLst>
+                                      </p:cBhvr>
+                                      <p:to>
+                                        <p:strVal val="visible"/>
+                                      </p:to>
+                                    </p:set>
+                                  </p:childTnLst>
+                                </p:cTn>
+                              </p:par>
+                            </p:childTnLst>
+                          </p:cTn>
+                        </p:par>
+                      </p:childTnLst>
+                    </p:cTn>
+                  </p:par>
+                </p:childTnLst>
+              </p:cTn>
+              <p:prevCondLst>
+                <p:cond evt="onPrev" delay="0">
+                  <p:tgtEl>
+                    <p:sldTgt/>
+                  </p:tgtEl>
+                </p:cond>
+              </p:prevCondLst>
+              <p:nextCondLst>
+                <p:cond evt="onNext" delay="0">
+                  <p:tgtEl>
+                    <p:sldTgt/>
+                  </p:tgtEl>
+                </p:cond>
+              </p:nextCondLst>
+            </p:seq>
+          </p:childTnLst>
+        </p:cTn>
+      </p:par>
+    </p:tnLst>
+    <p:bldLst>
+      <p:bldP spid="9" grpId="0" build="p"/>
+      <p:bldP spid="10" grpId="0" build="p"/>
+    </p:bldLst>
+  </p:timing>
+</p:sld>
+</file>
+
+<file path=ppt/slides/slide12.xml><?xml version="1.0" encoding="utf-8"?>
+<p:sld xmlns:a="http://schemas.openxmlformats.org/drawingml/2006/main" xmlns:r="http://schemas.openxmlformats.org/officeDocument/2006/relationships" xmlns:p="http://schemas.openxmlformats.org/presentationml/2006/main">
+  <p:cSld>
+    <p:spTree>
+      <p:nvGrpSpPr>
+        <p:cNvPr id="1" name=""/>
+        <p:cNvGrpSpPr/>
+        <p:nvPr/>
+      </p:nvGrpSpPr>
+      <p:grpSpPr>
+        <a:xfrm>
+          <a:off x="0" y="0"/>
+          <a:ext cx="0" cy="0"/>
+          <a:chOff x="0" y="0"/>
+          <a:chExt cx="0" cy="0"/>
+        </a:xfrm>
+      </p:grpSpPr>
+      <p:sp>
+        <p:nvSpPr>
+          <p:cNvPr id="2" name="Title 1">
+            <a:extLst>
+              <a:ext uri="{FF2B5EF4-FFF2-40B4-BE49-F238E27FC236}">
+                <a16:creationId xmlns:a16="http://schemas.microsoft.com/office/drawing/2014/main" id="{B58DD1FA-DF4E-4A82-A3AF-AA0371AC5AE3}"/>
+              </a:ext>
+            </a:extLst>
+          </p:cNvPr>
+          <p:cNvSpPr>
+            <a:spLocks noGrp="1"/>
+          </p:cNvSpPr>
+          <p:nvPr>
+            <p:ph type="title"/>
+          </p:nvPr>
+        </p:nvSpPr>
+        <p:spPr/>
+        <p:txBody>
+          <a:bodyPr/>
+          <a:lstStyle/>
+          <a:p>
+            <a:r>
+              <a:rPr lang="en-US" dirty="0"/>
+              <a:t>Online pilot</a:t>
+            </a:r>
+            <a:endParaRPr lang="en-GB" dirty="0"/>
+          </a:p>
+        </p:txBody>
+      </p:sp>
+      <p:sp>
+        <p:nvSpPr>
+          <p:cNvPr id="3" name="Content Placeholder 2">
+            <a:extLst>
+              <a:ext uri="{FF2B5EF4-FFF2-40B4-BE49-F238E27FC236}">
+                <a16:creationId xmlns:a16="http://schemas.microsoft.com/office/drawing/2014/main" id="{24062063-E8DA-4C52-82ED-4422BF804C76}"/>
+              </a:ext>
+            </a:extLst>
+          </p:cNvPr>
+          <p:cNvSpPr>
+            <a:spLocks noGrp="1"/>
+          </p:cNvSpPr>
+          <p:nvPr>
+            <p:ph idx="1"/>
+          </p:nvPr>
+        </p:nvSpPr>
+        <p:spPr/>
+        <p:txBody>
+          <a:bodyPr/>
+          <a:lstStyle/>
+          <a:p>
+            <a:r>
+              <a:rPr lang="en-US" dirty="0"/>
+              <a:t>Stimuli</a:t>
+            </a:r>
+            <a:endParaRPr lang="en-GB" dirty="0"/>
+          </a:p>
+        </p:txBody>
+      </p:sp>
+      <p:sp>
+        <p:nvSpPr>
+          <p:cNvPr id="4" name="Slide Number Placeholder 3">
+            <a:extLst>
+              <a:ext uri="{FF2B5EF4-FFF2-40B4-BE49-F238E27FC236}">
+                <a16:creationId xmlns:a16="http://schemas.microsoft.com/office/drawing/2014/main" id="{F786CB64-FCFE-4115-8E9A-4F5862C8FA75}"/>
+              </a:ext>
+            </a:extLst>
+          </p:cNvPr>
+          <p:cNvSpPr>
+            <a:spLocks noGrp="1"/>
+          </p:cNvSpPr>
+          <p:nvPr>
+            <p:ph type="sldNum" sz="quarter" idx="12"/>
+          </p:nvPr>
+        </p:nvSpPr>
+        <p:spPr/>
+        <p:txBody>
+          <a:bodyPr/>
+          <a:lstStyle/>
+          <a:p>
+            <a:fld id="{7AE184E0-0BD4-4705-A12B-9B71DDE63301}" type="slidenum">
+              <a:rPr lang="en-GB" noProof="0" smtClean="0"/>
+              <a:t>12</a:t>
+            </a:fld>
+            <a:endParaRPr lang="en-GB" noProof="0" dirty="0"/>
+          </a:p>
+        </p:txBody>
+      </p:sp>
+    </p:spTree>
+    <p:extLst>
+      <p:ext uri="{BB962C8B-B14F-4D97-AF65-F5344CB8AC3E}">
+        <p14:creationId xmlns:p14="http://schemas.microsoft.com/office/powerpoint/2010/main" val="3771963055"/>
+      </p:ext>
+    </p:extLst>
+  </p:cSld>
+  <p:clrMapOvr>
+    <a:masterClrMapping/>
+  </p:clrMapOvr>
+</p:sld>
+</file>
+
+<file path=ppt/slides/slide13.xml><?xml version="1.0" encoding="utf-8"?>
+<p:sld xmlns:a="http://schemas.openxmlformats.org/drawingml/2006/main" xmlns:r="http://schemas.openxmlformats.org/officeDocument/2006/relationships" xmlns:p="http://schemas.openxmlformats.org/presentationml/2006/main">
+  <p:cSld>
+    <p:spTree>
+      <p:nvGrpSpPr>
+        <p:cNvPr id="1" name=""/>
+        <p:cNvGrpSpPr/>
+        <p:nvPr/>
+      </p:nvGrpSpPr>
+      <p:grpSpPr>
+        <a:xfrm>
+          <a:off x="0" y="0"/>
+          <a:ext cx="0" cy="0"/>
+          <a:chOff x="0" y="0"/>
+          <a:chExt cx="0" cy="0"/>
+        </a:xfrm>
+      </p:grpSpPr>
       <p:pic>
         <p:nvPicPr>
           <p:cNvPr id="4" name="Picture Placeholder 3" descr="Timeline&#10;&#10;Description automatically generated">
@@ -4825,7 +5868,7 @@
 </p:sld>
 </file>
 
-<file path=ppt/slides/slide11.xml><?xml version="1.0" encoding="utf-8"?>
+<file path=ppt/slides/slide14.xml><?xml version="1.0" encoding="utf-8"?>
 <p:sld xmlns:a="http://schemas.openxmlformats.org/drawingml/2006/main" xmlns:r="http://schemas.openxmlformats.org/officeDocument/2006/relationships" xmlns:p="http://schemas.openxmlformats.org/presentationml/2006/main">
   <p:cSld>
     <p:spTree>
@@ -7029,7 +8072,7 @@
 </p:sld>
 </file>
 
-<file path=ppt/slides/slide12.xml><?xml version="1.0" encoding="utf-8"?>
+<file path=ppt/slides/slide15.xml><?xml version="1.0" encoding="utf-8"?>
 <p:sld xmlns:a="http://schemas.openxmlformats.org/drawingml/2006/main" xmlns:r="http://schemas.openxmlformats.org/officeDocument/2006/relationships" xmlns:p="http://schemas.openxmlformats.org/presentationml/2006/main">
   <p:cSld>
     <p:spTree>
@@ -7402,7 +8445,7 @@
 </p:sld>
 </file>
 
-<file path=ppt/slides/slide13.xml><?xml version="1.0" encoding="utf-8"?>
+<file path=ppt/slides/slide16.xml><?xml version="1.0" encoding="utf-8"?>
 <p:sld xmlns:a="http://schemas.openxmlformats.org/drawingml/2006/main" xmlns:r="http://schemas.openxmlformats.org/officeDocument/2006/relationships" xmlns:p="http://schemas.openxmlformats.org/presentationml/2006/main">
   <p:cSld>
     <p:spTree>
@@ -7463,7 +8506,7 @@
 </p:sld>
 </file>
 
-<file path=ppt/slides/slide14.xml><?xml version="1.0" encoding="utf-8"?>
+<file path=ppt/slides/slide17.xml><?xml version="1.0" encoding="utf-8"?>
 <p:sld xmlns:a="http://schemas.openxmlformats.org/drawingml/2006/main" xmlns:r="http://schemas.openxmlformats.org/officeDocument/2006/relationships" xmlns:p="http://schemas.openxmlformats.org/presentationml/2006/main">
   <p:cSld>
     <p:spTree>
@@ -7565,7 +8608,7 @@
 </p:sld>
 </file>
 
-<file path=ppt/slides/slide15.xml><?xml version="1.0" encoding="utf-8"?>
+<file path=ppt/slides/slide18.xml><?xml version="1.0" encoding="utf-8"?>
 <p:sld xmlns:a="http://schemas.openxmlformats.org/drawingml/2006/main" xmlns:r="http://schemas.openxmlformats.org/officeDocument/2006/relationships" xmlns:p="http://schemas.openxmlformats.org/presentationml/2006/main">
   <p:cSld>
     <p:spTree>
@@ -7631,7 +8674,7 @@
 </p:sld>
 </file>
 
-<file path=ppt/slides/slide16.xml><?xml version="1.0" encoding="utf-8"?>
+<file path=ppt/slides/slide19.xml><?xml version="1.0" encoding="utf-8"?>
 <p:sld xmlns:a="http://schemas.openxmlformats.org/drawingml/2006/main" xmlns:r="http://schemas.openxmlformats.org/officeDocument/2006/relationships" xmlns:p="http://schemas.openxmlformats.org/presentationml/2006/main">
   <p:cSld>
     <p:spTree>
@@ -7745,7 +8788,7 @@
           <a:p>
             <a:fld id="{7AE184E0-0BD4-4705-A12B-9B71DDE63301}" type="slidenum">
               <a:rPr lang="en-GB" noProof="0" smtClean="0"/>
-              <a:t>16</a:t>
+              <a:t>19</a:t>
             </a:fld>
             <a:endParaRPr lang="en-GB" noProof="0" dirty="0"/>
           </a:p>
@@ -7944,7 +8987,7 @@
 </p:sld>
 </file>
 
-<file path=ppt/slides/slide17.xml><?xml version="1.0" encoding="utf-8"?>
+<file path=ppt/slides/slide2.xml><?xml version="1.0" encoding="utf-8"?>
 <p:sld xmlns:a="http://schemas.openxmlformats.org/drawingml/2006/main" xmlns:r="http://schemas.openxmlformats.org/officeDocument/2006/relationships" xmlns:p="http://schemas.openxmlformats.org/presentationml/2006/main">
   <p:cSld>
     <p:spTree>
@@ -7963,6 +9006,83 @@
       </p:grpSpPr>
       <p:sp>
         <p:nvSpPr>
+          <p:cNvPr id="2" name="Picture Placeholder 1">
+            <a:extLst>
+              <a:ext uri="{FF2B5EF4-FFF2-40B4-BE49-F238E27FC236}">
+                <a16:creationId xmlns:a16="http://schemas.microsoft.com/office/drawing/2014/main" id="{34D06151-2AAD-431B-8D96-68AA434EE566}"/>
+              </a:ext>
+            </a:extLst>
+          </p:cNvPr>
+          <p:cNvSpPr>
+            <a:spLocks noGrp="1"/>
+          </p:cNvSpPr>
+          <p:nvPr>
+            <p:ph type="pic" sz="quarter" idx="12"/>
+          </p:nvPr>
+        </p:nvSpPr>
+        <p:spPr/>
+      </p:sp>
+      <p:sp>
+        <p:nvSpPr>
+          <p:cNvPr id="3" name="Text Placeholder 2">
+            <a:extLst>
+              <a:ext uri="{FF2B5EF4-FFF2-40B4-BE49-F238E27FC236}">
+                <a16:creationId xmlns:a16="http://schemas.microsoft.com/office/drawing/2014/main" id="{B43CB3E5-E2DB-4A64-B6FC-556B9BB2E336}"/>
+              </a:ext>
+            </a:extLst>
+          </p:cNvPr>
+          <p:cNvSpPr>
+            <a:spLocks noGrp="1"/>
+          </p:cNvSpPr>
+          <p:nvPr>
+            <p:ph type="body" sz="quarter" idx="13"/>
+          </p:nvPr>
+        </p:nvSpPr>
+        <p:spPr/>
+        <p:txBody>
+          <a:bodyPr/>
+          <a:lstStyle/>
+          <a:p>
+            <a:r>
+              <a:rPr lang="en-US" dirty="0"/>
+              <a:t>Recap</a:t>
+            </a:r>
+            <a:endParaRPr lang="en-GB" dirty="0"/>
+          </a:p>
+        </p:txBody>
+      </p:sp>
+    </p:spTree>
+    <p:extLst>
+      <p:ext uri="{BB962C8B-B14F-4D97-AF65-F5344CB8AC3E}">
+        <p14:creationId xmlns:p14="http://schemas.microsoft.com/office/powerpoint/2010/main" val="1728512294"/>
+      </p:ext>
+    </p:extLst>
+  </p:cSld>
+  <p:clrMapOvr>
+    <a:masterClrMapping/>
+  </p:clrMapOvr>
+</p:sld>
+</file>
+
+<file path=ppt/slides/slide20.xml><?xml version="1.0" encoding="utf-8"?>
+<p:sld xmlns:a="http://schemas.openxmlformats.org/drawingml/2006/main" xmlns:r="http://schemas.openxmlformats.org/officeDocument/2006/relationships" xmlns:p="http://schemas.openxmlformats.org/presentationml/2006/main">
+  <p:cSld>
+    <p:spTree>
+      <p:nvGrpSpPr>
+        <p:cNvPr id="1" name=""/>
+        <p:cNvGrpSpPr/>
+        <p:nvPr/>
+      </p:nvGrpSpPr>
+      <p:grpSpPr>
+        <a:xfrm>
+          <a:off x="0" y="0"/>
+          <a:ext cx="0" cy="0"/>
+          <a:chOff x="0" y="0"/>
+          <a:chExt cx="0" cy="0"/>
+        </a:xfrm>
+      </p:grpSpPr>
+      <p:sp>
+        <p:nvSpPr>
           <p:cNvPr id="2" name="Title 1">
             <a:extLst>
               <a:ext uri="{FF2B5EF4-FFF2-40B4-BE49-F238E27FC236}">
@@ -8013,7 +9133,7 @@
           <a:p>
             <a:fld id="{7AE184E0-0BD4-4705-A12B-9B71DDE63301}" type="slidenum">
               <a:rPr lang="en-GB" noProof="0" smtClean="0"/>
-              <a:t>17</a:t>
+              <a:t>20</a:t>
             </a:fld>
             <a:endParaRPr lang="en-GB" noProof="0" dirty="0"/>
           </a:p>
@@ -9084,7 +10204,7 @@
 </p:sld>
 </file>
 
-<file path=ppt/slides/slide18.xml><?xml version="1.0" encoding="utf-8"?>
+<file path=ppt/slides/slide21.xml><?xml version="1.0" encoding="utf-8"?>
 <p:sld xmlns:a="http://schemas.openxmlformats.org/drawingml/2006/main" xmlns:r="http://schemas.openxmlformats.org/officeDocument/2006/relationships" xmlns:p="http://schemas.openxmlformats.org/presentationml/2006/main">
   <p:cSld>
     <p:spTree>
@@ -9188,7 +10308,7 @@
           <a:p>
             <a:fld id="{7AE184E0-0BD4-4705-A12B-9B71DDE63301}" type="slidenum">
               <a:rPr lang="en-GB" noProof="0" smtClean="0"/>
-              <a:t>18</a:t>
+              <a:t>21</a:t>
             </a:fld>
             <a:endParaRPr lang="en-GB" noProof="0" dirty="0"/>
           </a:p>
@@ -9207,7 +10327,7 @@
 </p:sld>
 </file>
 
-<file path=ppt/slides/slide19.xml><?xml version="1.0" encoding="utf-8"?>
+<file path=ppt/slides/slide22.xml><?xml version="1.0" encoding="utf-8"?>
 <p:sld xmlns:a="http://schemas.openxmlformats.org/drawingml/2006/main" xmlns:r="http://schemas.openxmlformats.org/officeDocument/2006/relationships" xmlns:p="http://schemas.openxmlformats.org/presentationml/2006/main">
   <p:cSld>
     <p:spTree>
@@ -9321,7 +10441,7 @@
           <a:p>
             <a:fld id="{7AE184E0-0BD4-4705-A12B-9B71DDE63301}" type="slidenum">
               <a:rPr lang="en-GB" noProof="0" smtClean="0"/>
-              <a:t>19</a:t>
+              <a:t>22</a:t>
             </a:fld>
             <a:endParaRPr lang="en-GB" noProof="0" dirty="0"/>
           </a:p>
@@ -9546,7 +10666,7 @@
 </p:sld>
 </file>
 
-<file path=ppt/slides/slide2.xml><?xml version="1.0" encoding="utf-8"?>
+<file path=ppt/slides/slide23.xml><?xml version="1.0" encoding="utf-8"?>
 <p:sld xmlns:a="http://schemas.openxmlformats.org/drawingml/2006/main" xmlns:r="http://schemas.openxmlformats.org/officeDocument/2006/relationships" xmlns:p="http://schemas.openxmlformats.org/presentationml/2006/main">
   <p:cSld>
     <p:spTree>
@@ -9565,115 +10685,6 @@
       </p:grpSpPr>
       <p:sp>
         <p:nvSpPr>
-          <p:cNvPr id="2" name="Picture Placeholder 1">
-            <a:extLst>
-              <a:ext uri="{FF2B5EF4-FFF2-40B4-BE49-F238E27FC236}">
-                <a16:creationId xmlns:a16="http://schemas.microsoft.com/office/drawing/2014/main" id="{34D06151-2AAD-431B-8D96-68AA434EE566}"/>
-              </a:ext>
-            </a:extLst>
-          </p:cNvPr>
-          <p:cNvSpPr>
-            <a:spLocks noGrp="1"/>
-          </p:cNvSpPr>
-          <p:nvPr>
-            <p:ph type="pic" sz="quarter" idx="12"/>
-          </p:nvPr>
-        </p:nvSpPr>
-        <p:spPr/>
-      </p:sp>
-      <p:sp>
-        <p:nvSpPr>
-          <p:cNvPr id="3" name="Text Placeholder 2">
-            <a:extLst>
-              <a:ext uri="{FF2B5EF4-FFF2-40B4-BE49-F238E27FC236}">
-                <a16:creationId xmlns:a16="http://schemas.microsoft.com/office/drawing/2014/main" id="{B43CB3E5-E2DB-4A64-B6FC-556B9BB2E336}"/>
-              </a:ext>
-            </a:extLst>
-          </p:cNvPr>
-          <p:cNvSpPr>
-            <a:spLocks noGrp="1"/>
-          </p:cNvSpPr>
-          <p:nvPr>
-            <p:ph type="body" sz="quarter" idx="13"/>
-          </p:nvPr>
-        </p:nvSpPr>
-        <p:spPr/>
-        <p:txBody>
-          <a:bodyPr/>
-          <a:lstStyle/>
-          <a:p>
-            <a:r>
-              <a:rPr lang="en-US" dirty="0"/>
-              <a:t>Recap</a:t>
-            </a:r>
-            <a:endParaRPr lang="en-GB" dirty="0"/>
-          </a:p>
-        </p:txBody>
-      </p:sp>
-      <p:pic>
-        <p:nvPicPr>
-          <p:cNvPr id="4" name="Picture 3">
-            <a:extLst>
-              <a:ext uri="{FF2B5EF4-FFF2-40B4-BE49-F238E27FC236}">
-                <a16:creationId xmlns:a16="http://schemas.microsoft.com/office/drawing/2014/main" id="{523D24F9-53C9-4BD1-9719-9EA6DA2455CD}"/>
-              </a:ext>
-            </a:extLst>
-          </p:cNvPr>
-          <p:cNvPicPr>
-            <a:picLocks noChangeAspect="1"/>
-          </p:cNvPicPr>
-          <p:nvPr/>
-        </p:nvPicPr>
-        <p:blipFill>
-          <a:blip r:embed="rId2">
-            <a:alphaModFix amt="20000"/>
-          </a:blip>
-          <a:stretch>
-            <a:fillRect/>
-          </a:stretch>
-        </p:blipFill>
-        <p:spPr>
-          <a:xfrm>
-            <a:off x="11161309" y="2612571"/>
-            <a:ext cx="2694857" cy="2694857"/>
-          </a:xfrm>
-          <a:prstGeom prst="rect">
-            <a:avLst/>
-          </a:prstGeom>
-        </p:spPr>
-      </p:pic>
-    </p:spTree>
-    <p:extLst>
-      <p:ext uri="{BB962C8B-B14F-4D97-AF65-F5344CB8AC3E}">
-        <p14:creationId xmlns:p14="http://schemas.microsoft.com/office/powerpoint/2010/main" val="1728512294"/>
-      </p:ext>
-    </p:extLst>
-  </p:cSld>
-  <p:clrMapOvr>
-    <a:masterClrMapping/>
-  </p:clrMapOvr>
-</p:sld>
-</file>
-
-<file path=ppt/slides/slide20.xml><?xml version="1.0" encoding="utf-8"?>
-<p:sld xmlns:a="http://schemas.openxmlformats.org/drawingml/2006/main" xmlns:r="http://schemas.openxmlformats.org/officeDocument/2006/relationships" xmlns:p="http://schemas.openxmlformats.org/presentationml/2006/main">
-  <p:cSld>
-    <p:spTree>
-      <p:nvGrpSpPr>
-        <p:cNvPr id="1" name=""/>
-        <p:cNvGrpSpPr/>
-        <p:nvPr/>
-      </p:nvGrpSpPr>
-      <p:grpSpPr>
-        <a:xfrm>
-          <a:off x="0" y="0"/>
-          <a:ext cx="0" cy="0"/>
-          <a:chOff x="0" y="0"/>
-          <a:chExt cx="0" cy="0"/>
-        </a:xfrm>
-      </p:grpSpPr>
-      <p:sp>
-        <p:nvSpPr>
           <p:cNvPr id="2" name="Title 1">
             <a:extLst>
               <a:ext uri="{FF2B5EF4-FFF2-40B4-BE49-F238E27FC236}">
@@ -9807,7 +10818,7 @@
           <a:p>
             <a:fld id="{7AE184E0-0BD4-4705-A12B-9B71DDE63301}" type="slidenum">
               <a:rPr lang="en-GB" noProof="0" smtClean="0"/>
-              <a:t>20</a:t>
+              <a:t>23</a:t>
             </a:fld>
             <a:endParaRPr lang="en-GB" noProof="0" dirty="0"/>
           </a:p>
@@ -10127,7 +11138,7 @@
 </p:sld>
 </file>
 
-<file path=ppt/slides/slide21.xml><?xml version="1.0" encoding="utf-8"?>
+<file path=ppt/slides/slide24.xml><?xml version="1.0" encoding="utf-8"?>
 <p:sld xmlns:a="http://schemas.openxmlformats.org/drawingml/2006/main" xmlns:r="http://schemas.openxmlformats.org/officeDocument/2006/relationships" xmlns:p="http://schemas.openxmlformats.org/presentationml/2006/main">
   <p:cSld>
     <p:spTree>
@@ -10196,7 +11207,7 @@
           <a:p>
             <a:fld id="{7AE184E0-0BD4-4705-A12B-9B71DDE63301}" type="slidenum">
               <a:rPr lang="en-GB" noProof="0" smtClean="0"/>
-              <a:t>21</a:t>
+              <a:t>24</a:t>
             </a:fld>
             <a:endParaRPr lang="en-GB" noProof="0" dirty="0"/>
           </a:p>
@@ -10506,7 +11517,7 @@
 </p:sld>
 </file>
 
-<file path=ppt/slides/slide22.xml><?xml version="1.0" encoding="utf-8"?>
+<file path=ppt/slides/slide25.xml><?xml version="1.0" encoding="utf-8"?>
 <p:sld xmlns:a="http://schemas.openxmlformats.org/drawingml/2006/main" xmlns:r="http://schemas.openxmlformats.org/officeDocument/2006/relationships" xmlns:p="http://schemas.openxmlformats.org/presentationml/2006/main">
   <p:cSld>
     <p:spTree>
@@ -10575,13 +11586,13 @@
           <a:p>
             <a:r>
               <a:rPr lang="en-US" dirty="0"/>
-              <a:t>Spline as baseline / ‘null’?</a:t>
+              <a:t>Spline over stepsleft as baseline / ‘null’?</a:t>
             </a:r>
           </a:p>
           <a:p>
             <a:r>
               <a:rPr lang="en-US" dirty="0"/>
-              <a:t>Compare versus ‘theory’</a:t>
+              <a:t>Compare versus ‘theoretical’ regressors</a:t>
             </a:r>
           </a:p>
         </p:txBody>
@@ -10609,7 +11620,7 @@
           <a:p>
             <a:fld id="{7AE184E0-0BD4-4705-A12B-9B71DDE63301}" type="slidenum">
               <a:rPr lang="en-GB" noProof="0" smtClean="0"/>
-              <a:t>22</a:t>
+              <a:t>25</a:t>
             </a:fld>
             <a:endParaRPr lang="en-GB" noProof="0" dirty="0"/>
           </a:p>
@@ -10759,7 +11770,7 @@
 </p:sld>
 </file>
 
-<file path=ppt/slides/slide23.xml><?xml version="1.0" encoding="utf-8"?>
+<file path=ppt/slides/slide26.xml><?xml version="1.0" encoding="utf-8"?>
 <p:sld xmlns:a="http://schemas.openxmlformats.org/drawingml/2006/main" xmlns:r="http://schemas.openxmlformats.org/officeDocument/2006/relationships" xmlns:p="http://schemas.openxmlformats.org/presentationml/2006/main">
   <p:cSld>
     <p:spTree>
@@ -10828,7 +11839,7 @@
           <a:p>
             <a:r>
               <a:rPr lang="en-US" dirty="0"/>
-              <a:t>Y ~ Bin[ </a:t>
+              <a:t>Y ~ Bern[ </a:t>
             </a:r>
             <a:r>
               <a:rPr lang="en-US" sz="4800" dirty="0"/>
@@ -10918,7 +11929,7 @@
           <a:p>
             <a:fld id="{7AE184E0-0BD4-4705-A12B-9B71DDE63301}" type="slidenum">
               <a:rPr lang="en-GB" noProof="0" smtClean="0"/>
-              <a:t>23</a:t>
+              <a:t>26</a:t>
             </a:fld>
             <a:endParaRPr lang="en-GB" noProof="0" dirty="0"/>
           </a:p>
@@ -11238,7 +12249,7 @@
 </p:sld>
 </file>
 
-<file path=ppt/slides/slide24.xml><?xml version="1.0" encoding="utf-8"?>
+<file path=ppt/slides/slide27.xml><?xml version="1.0" encoding="utf-8"?>
 <p:sld xmlns:a="http://schemas.openxmlformats.org/drawingml/2006/main" xmlns:r="http://schemas.openxmlformats.org/officeDocument/2006/relationships" xmlns:p="http://schemas.openxmlformats.org/presentationml/2006/main">
   <p:cSld>
     <p:spTree>
@@ -11336,7 +12347,7 @@
           <a:p>
             <a:fld id="{7AE184E0-0BD4-4705-A12B-9B71DDE63301}" type="slidenum">
               <a:rPr lang="en-GB" noProof="0" smtClean="0"/>
-              <a:t>24</a:t>
+              <a:t>27</a:t>
             </a:fld>
             <a:endParaRPr lang="en-GB" noProof="0" dirty="0"/>
           </a:p>
@@ -11460,7 +12471,7 @@
 </p:sld>
 </file>
 
-<file path=ppt/slides/slide25.xml><?xml version="1.0" encoding="utf-8"?>
+<file path=ppt/slides/slide28.xml><?xml version="1.0" encoding="utf-8"?>
 <p:sld xmlns:a="http://schemas.openxmlformats.org/drawingml/2006/main" xmlns:r="http://schemas.openxmlformats.org/officeDocument/2006/relationships" xmlns:p="http://schemas.openxmlformats.org/presentationml/2006/main">
   <p:cSld>
     <p:spTree>
@@ -11563,7 +12574,7 @@
           <a:p>
             <a:fld id="{7AE184E0-0BD4-4705-A12B-9B71DDE63301}" type="slidenum">
               <a:rPr lang="en-GB" noProof="0" smtClean="0"/>
-              <a:t>25</a:t>
+              <a:t>28</a:t>
             </a:fld>
             <a:endParaRPr lang="en-GB" noProof="0" dirty="0"/>
           </a:p>
@@ -11687,7 +12698,7 @@
 </p:sld>
 </file>
 
-<file path=ppt/slides/slide26.xml><?xml version="1.0" encoding="utf-8"?>
+<file path=ppt/slides/slide29.xml><?xml version="1.0" encoding="utf-8"?>
 <p:sld xmlns:a="http://schemas.openxmlformats.org/drawingml/2006/main" xmlns:r="http://schemas.openxmlformats.org/officeDocument/2006/relationships" xmlns:p="http://schemas.openxmlformats.org/presentationml/2006/main">
   <p:cSld>
     <p:spTree>
@@ -11785,7 +12796,7 @@
           <a:p>
             <a:fld id="{7AE184E0-0BD4-4705-A12B-9B71DDE63301}" type="slidenum">
               <a:rPr lang="en-GB" noProof="0" smtClean="0"/>
-              <a:t>26</a:t>
+              <a:t>29</a:t>
             </a:fld>
             <a:endParaRPr lang="en-GB" noProof="0" dirty="0"/>
           </a:p>
@@ -11825,247 +12836,6 @@
     <p:extLst>
       <p:ext uri="{BB962C8B-B14F-4D97-AF65-F5344CB8AC3E}">
         <p14:creationId xmlns:p14="http://schemas.microsoft.com/office/powerpoint/2010/main" val="2341941704"/>
-      </p:ext>
-    </p:extLst>
-  </p:cSld>
-  <p:clrMapOvr>
-    <a:masterClrMapping/>
-  </p:clrMapOvr>
-</p:sld>
-</file>
-
-<file path=ppt/slides/slide27.xml><?xml version="1.0" encoding="utf-8"?>
-<p:sld xmlns:a="http://schemas.openxmlformats.org/drawingml/2006/main" xmlns:r="http://schemas.openxmlformats.org/officeDocument/2006/relationships" xmlns:p="http://schemas.openxmlformats.org/presentationml/2006/main">
-  <p:cSld>
-    <p:spTree>
-      <p:nvGrpSpPr>
-        <p:cNvPr id="1" name=""/>
-        <p:cNvGrpSpPr/>
-        <p:nvPr/>
-      </p:nvGrpSpPr>
-      <p:grpSpPr>
-        <a:xfrm>
-          <a:off x="0" y="0"/>
-          <a:ext cx="0" cy="0"/>
-          <a:chOff x="0" y="0"/>
-          <a:chExt cx="0" cy="0"/>
-        </a:xfrm>
-      </p:grpSpPr>
-      <p:sp>
-        <p:nvSpPr>
-          <p:cNvPr id="2" name="Title 1">
-            <a:extLst>
-              <a:ext uri="{FF2B5EF4-FFF2-40B4-BE49-F238E27FC236}">
-                <a16:creationId xmlns:a16="http://schemas.microsoft.com/office/drawing/2014/main" id="{DFDFB59F-ECB8-492E-9D5D-07AA7DEF6793}"/>
-              </a:ext>
-            </a:extLst>
-          </p:cNvPr>
-          <p:cNvSpPr>
-            <a:spLocks noGrp="1"/>
-          </p:cNvSpPr>
-          <p:nvPr>
-            <p:ph type="title"/>
-          </p:nvPr>
-        </p:nvSpPr>
-        <p:spPr/>
-        <p:txBody>
-          <a:bodyPr/>
-          <a:lstStyle/>
-          <a:p>
-            <a:r>
-              <a:rPr lang="en-US" dirty="0"/>
-              <a:t>simulations</a:t>
-            </a:r>
-            <a:endParaRPr lang="en-GB" dirty="0"/>
-          </a:p>
-        </p:txBody>
-      </p:sp>
-      <p:sp>
-        <p:nvSpPr>
-          <p:cNvPr id="3" name="Content Placeholder 2">
-            <a:extLst>
-              <a:ext uri="{FF2B5EF4-FFF2-40B4-BE49-F238E27FC236}">
-                <a16:creationId xmlns:a16="http://schemas.microsoft.com/office/drawing/2014/main" id="{86EF79FC-4FF1-4D06-8A24-9A943F10BB29}"/>
-              </a:ext>
-            </a:extLst>
-          </p:cNvPr>
-          <p:cNvSpPr>
-            <a:spLocks noGrp="1"/>
-          </p:cNvSpPr>
-          <p:nvPr>
-            <p:ph idx="1"/>
-          </p:nvPr>
-        </p:nvSpPr>
-        <p:spPr/>
-        <p:txBody>
-          <a:bodyPr/>
-          <a:lstStyle/>
-          <a:p>
-            <a:r>
-              <a:rPr lang="en-US" dirty="0"/>
-              <a:t>Linear</a:t>
-            </a:r>
-            <a:endParaRPr lang="en-GB" dirty="0"/>
-          </a:p>
-        </p:txBody>
-      </p:sp>
-      <p:sp>
-        <p:nvSpPr>
-          <p:cNvPr id="4" name="Slide Number Placeholder 3">
-            <a:extLst>
-              <a:ext uri="{FF2B5EF4-FFF2-40B4-BE49-F238E27FC236}">
-                <a16:creationId xmlns:a16="http://schemas.microsoft.com/office/drawing/2014/main" id="{3401F741-951D-4B91-9FA6-A8C1BF82C48D}"/>
-              </a:ext>
-            </a:extLst>
-          </p:cNvPr>
-          <p:cNvSpPr>
-            <a:spLocks noGrp="1"/>
-          </p:cNvSpPr>
-          <p:nvPr>
-            <p:ph type="sldNum" sz="quarter" idx="12"/>
-          </p:nvPr>
-        </p:nvSpPr>
-        <p:spPr/>
-        <p:txBody>
-          <a:bodyPr/>
-          <a:lstStyle/>
-          <a:p>
-            <a:fld id="{7AE184E0-0BD4-4705-A12B-9B71DDE63301}" type="slidenum">
-              <a:rPr lang="en-GB" noProof="0" smtClean="0"/>
-              <a:t>27</a:t>
-            </a:fld>
-            <a:endParaRPr lang="en-GB" noProof="0" dirty="0"/>
-          </a:p>
-        </p:txBody>
-      </p:sp>
-      <p:pic>
-        <p:nvPicPr>
-          <p:cNvPr id="5" name="Picture 4">
-            <a:extLst>
-              <a:ext uri="{FF2B5EF4-FFF2-40B4-BE49-F238E27FC236}">
-                <a16:creationId xmlns:a16="http://schemas.microsoft.com/office/drawing/2014/main" id="{885AC243-DC67-47DB-981F-E82D329F8A9F}"/>
-              </a:ext>
-            </a:extLst>
-          </p:cNvPr>
-          <p:cNvPicPr>
-            <a:picLocks noChangeAspect="1"/>
-          </p:cNvPicPr>
-          <p:nvPr/>
-        </p:nvPicPr>
-        <p:blipFill>
-          <a:blip r:embed="rId2"/>
-          <a:stretch>
-            <a:fillRect/>
-          </a:stretch>
-        </p:blipFill>
-        <p:spPr>
-          <a:xfrm>
-            <a:off x="2265728" y="2775703"/>
-            <a:ext cx="12807217" cy="4202194"/>
-          </a:xfrm>
-          <a:prstGeom prst="rect">
-            <a:avLst/>
-          </a:prstGeom>
-        </p:spPr>
-      </p:pic>
-      <p:sp>
-        <p:nvSpPr>
-          <p:cNvPr id="6" name="TextBox 5">
-            <a:extLst>
-              <a:ext uri="{FF2B5EF4-FFF2-40B4-BE49-F238E27FC236}">
-                <a16:creationId xmlns:a16="http://schemas.microsoft.com/office/drawing/2014/main" id="{1D443B91-4A6F-438B-A97D-339E157E2FE7}"/>
-              </a:ext>
-            </a:extLst>
-          </p:cNvPr>
-          <p:cNvSpPr txBox="1"/>
-          <p:nvPr/>
-        </p:nvSpPr>
-        <p:spPr>
-          <a:xfrm>
-            <a:off x="10034649" y="7077694"/>
-            <a:ext cx="5038296" cy="511615"/>
-          </a:xfrm>
-          <a:prstGeom prst="rect">
-            <a:avLst/>
-          </a:prstGeom>
-          <a:noFill/>
-        </p:spPr>
-        <p:txBody>
-          <a:bodyPr wrap="square" rtlCol="0">
-            <a:spAutoFit/>
-          </a:bodyPr>
-          <a:lstStyle/>
-          <a:p>
-            <a:pPr algn="l">
-              <a:lnSpc>
-                <a:spcPct val="120000"/>
-              </a:lnSpc>
-            </a:pPr>
-            <a:r>
-              <a:rPr lang="en-US" sz="2500" dirty="0"/>
-              <a:t>BF (linear vs spline) = 506.62  </a:t>
-            </a:r>
-            <a:endParaRPr lang="en-GB" sz="2500" dirty="0"/>
-          </a:p>
-        </p:txBody>
-      </p:sp>
-      <p:sp>
-        <p:nvSpPr>
-          <p:cNvPr id="7" name="TextBox 6">
-            <a:extLst>
-              <a:ext uri="{FF2B5EF4-FFF2-40B4-BE49-F238E27FC236}">
-                <a16:creationId xmlns:a16="http://schemas.microsoft.com/office/drawing/2014/main" id="{88063706-F098-4315-8123-EA3D249F4395}"/>
-              </a:ext>
-            </a:extLst>
-          </p:cNvPr>
-          <p:cNvSpPr txBox="1"/>
-          <p:nvPr/>
-        </p:nvSpPr>
-        <p:spPr>
-          <a:xfrm>
-            <a:off x="10117777" y="7766462"/>
-            <a:ext cx="4096987" cy="511615"/>
-          </a:xfrm>
-          <a:prstGeom prst="rect">
-            <a:avLst/>
-          </a:prstGeom>
-          <a:noFill/>
-        </p:spPr>
-        <p:txBody>
-          <a:bodyPr wrap="square" rtlCol="0">
-            <a:spAutoFit/>
-          </a:bodyPr>
-          <a:lstStyle/>
-          <a:p>
-            <a:pPr algn="l">
-              <a:lnSpc>
-                <a:spcPct val="120000"/>
-              </a:lnSpc>
-            </a:pPr>
-            <a:r>
-              <a:rPr lang="en-US" sz="2500" dirty="0"/>
-              <a:t>For 5 pp: </a:t>
-            </a:r>
-            <a:r>
-              <a:rPr lang="en-US" sz="2500" dirty="0">
-                <a:solidFill>
-                  <a:schemeClr val="accent1"/>
-                </a:solidFill>
-              </a:rPr>
-              <a:t>217 </a:t>
-            </a:r>
-            <a:r>
-              <a:rPr lang="en-US" sz="2500" dirty="0"/>
-              <a:t>parameters</a:t>
-            </a:r>
-            <a:endParaRPr lang="en-GB" sz="2500" dirty="0"/>
-          </a:p>
-        </p:txBody>
-      </p:sp>
-    </p:spTree>
-    <p:extLst>
-      <p:ext uri="{BB962C8B-B14F-4D97-AF65-F5344CB8AC3E}">
-        <p14:creationId xmlns:p14="http://schemas.microsoft.com/office/powerpoint/2010/main" val="3095457027"/>
       </p:ext>
     </p:extLst>
   </p:cSld>
@@ -12147,466 +12917,6 @@
       </p:par>
     </p:tnLst>
   </p:timing>
-</p:sld>
-</file>
-
-<file path=ppt/slides/slide28.xml><?xml version="1.0" encoding="utf-8"?>
-<p:sld xmlns:a="http://schemas.openxmlformats.org/drawingml/2006/main" xmlns:r="http://schemas.openxmlformats.org/officeDocument/2006/relationships" xmlns:p="http://schemas.openxmlformats.org/presentationml/2006/main">
-  <p:cSld>
-    <p:spTree>
-      <p:nvGrpSpPr>
-        <p:cNvPr id="1" name=""/>
-        <p:cNvGrpSpPr/>
-        <p:nvPr/>
-      </p:nvGrpSpPr>
-      <p:grpSpPr>
-        <a:xfrm>
-          <a:off x="0" y="0"/>
-          <a:ext cx="0" cy="0"/>
-          <a:chOff x="0" y="0"/>
-          <a:chExt cx="0" cy="0"/>
-        </a:xfrm>
-      </p:grpSpPr>
-      <p:sp>
-        <p:nvSpPr>
-          <p:cNvPr id="2" name="Title 1">
-            <a:extLst>
-              <a:ext uri="{FF2B5EF4-FFF2-40B4-BE49-F238E27FC236}">
-                <a16:creationId xmlns:a16="http://schemas.microsoft.com/office/drawing/2014/main" id="{E10A4AEC-9B8E-4FD0-A57F-34CA7C025331}"/>
-              </a:ext>
-            </a:extLst>
-          </p:cNvPr>
-          <p:cNvSpPr>
-            <a:spLocks noGrp="1"/>
-          </p:cNvSpPr>
-          <p:nvPr>
-            <p:ph type="title"/>
-          </p:nvPr>
-        </p:nvSpPr>
-        <p:spPr/>
-        <p:txBody>
-          <a:bodyPr/>
-          <a:lstStyle/>
-          <a:p>
-            <a:r>
-              <a:rPr lang="en-US" dirty="0"/>
-              <a:t>Simulations</a:t>
-            </a:r>
-            <a:endParaRPr lang="en-GB" dirty="0"/>
-          </a:p>
-        </p:txBody>
-      </p:sp>
-      <p:sp>
-        <p:nvSpPr>
-          <p:cNvPr id="3" name="Content Placeholder 2">
-            <a:extLst>
-              <a:ext uri="{FF2B5EF4-FFF2-40B4-BE49-F238E27FC236}">
-                <a16:creationId xmlns:a16="http://schemas.microsoft.com/office/drawing/2014/main" id="{ABC40EDC-5E92-40FC-A5FE-0F2EBEEF3E3B}"/>
-              </a:ext>
-            </a:extLst>
-          </p:cNvPr>
-          <p:cNvSpPr>
-            <a:spLocks noGrp="1"/>
-          </p:cNvSpPr>
-          <p:nvPr>
-            <p:ph idx="1"/>
-          </p:nvPr>
-        </p:nvSpPr>
-        <p:spPr/>
-        <p:txBody>
-          <a:bodyPr/>
-          <a:lstStyle/>
-          <a:p>
-            <a:r>
-              <a:rPr lang="en-US" dirty="0"/>
-              <a:t>Improve with &amp; test theoretical effect?</a:t>
-            </a:r>
-            <a:endParaRPr lang="en-GB" dirty="0"/>
-          </a:p>
-        </p:txBody>
-      </p:sp>
-      <p:sp>
-        <p:nvSpPr>
-          <p:cNvPr id="4" name="Slide Number Placeholder 3">
-            <a:extLst>
-              <a:ext uri="{FF2B5EF4-FFF2-40B4-BE49-F238E27FC236}">
-                <a16:creationId xmlns:a16="http://schemas.microsoft.com/office/drawing/2014/main" id="{11D68AEF-C2AF-4103-B501-8623DEA6C588}"/>
-              </a:ext>
-            </a:extLst>
-          </p:cNvPr>
-          <p:cNvSpPr>
-            <a:spLocks noGrp="1"/>
-          </p:cNvSpPr>
-          <p:nvPr>
-            <p:ph type="sldNum" sz="quarter" idx="12"/>
-          </p:nvPr>
-        </p:nvSpPr>
-        <p:spPr/>
-        <p:txBody>
-          <a:bodyPr/>
-          <a:lstStyle/>
-          <a:p>
-            <a:fld id="{7AE184E0-0BD4-4705-A12B-9B71DDE63301}" type="slidenum">
-              <a:rPr lang="en-GB" noProof="0" smtClean="0"/>
-              <a:t>28</a:t>
-            </a:fld>
-            <a:endParaRPr lang="en-GB" noProof="0" dirty="0"/>
-          </a:p>
-        </p:txBody>
-      </p:sp>
-      <p:pic>
-        <p:nvPicPr>
-          <p:cNvPr id="7" name="Picture 6">
-            <a:extLst>
-              <a:ext uri="{FF2B5EF4-FFF2-40B4-BE49-F238E27FC236}">
-                <a16:creationId xmlns:a16="http://schemas.microsoft.com/office/drawing/2014/main" id="{E0767344-0C20-4CC7-83E7-B7F1C9A1A591}"/>
-              </a:ext>
-            </a:extLst>
-          </p:cNvPr>
-          <p:cNvPicPr>
-            <a:picLocks noChangeAspect="1"/>
-          </p:cNvPicPr>
-          <p:nvPr/>
-        </p:nvPicPr>
-        <p:blipFill>
-          <a:blip r:embed="rId2"/>
-          <a:stretch>
-            <a:fillRect/>
-          </a:stretch>
-        </p:blipFill>
-        <p:spPr>
-          <a:xfrm>
-            <a:off x="2790702" y="2064599"/>
-            <a:ext cx="12496160" cy="5904436"/>
-          </a:xfrm>
-          <a:prstGeom prst="rect">
-            <a:avLst/>
-          </a:prstGeom>
-        </p:spPr>
-      </p:pic>
-    </p:spTree>
-    <p:extLst>
-      <p:ext uri="{BB962C8B-B14F-4D97-AF65-F5344CB8AC3E}">
-        <p14:creationId xmlns:p14="http://schemas.microsoft.com/office/powerpoint/2010/main" val="4170585177"/>
-      </p:ext>
-    </p:extLst>
-  </p:cSld>
-  <p:clrMapOvr>
-    <a:masterClrMapping/>
-  </p:clrMapOvr>
-</p:sld>
-</file>
-
-<file path=ppt/slides/slide29.xml><?xml version="1.0" encoding="utf-8"?>
-<p:sld xmlns:a="http://schemas.openxmlformats.org/drawingml/2006/main" xmlns:r="http://schemas.openxmlformats.org/officeDocument/2006/relationships" xmlns:p="http://schemas.openxmlformats.org/presentationml/2006/main">
-  <p:cSld>
-    <p:spTree>
-      <p:nvGrpSpPr>
-        <p:cNvPr id="1" name=""/>
-        <p:cNvGrpSpPr/>
-        <p:nvPr/>
-      </p:nvGrpSpPr>
-      <p:grpSpPr>
-        <a:xfrm>
-          <a:off x="0" y="0"/>
-          <a:ext cx="0" cy="0"/>
-          <a:chOff x="0" y="0"/>
-          <a:chExt cx="0" cy="0"/>
-        </a:xfrm>
-      </p:grpSpPr>
-      <p:sp>
-        <p:nvSpPr>
-          <p:cNvPr id="2" name="Title 1">
-            <a:extLst>
-              <a:ext uri="{FF2B5EF4-FFF2-40B4-BE49-F238E27FC236}">
-                <a16:creationId xmlns:a16="http://schemas.microsoft.com/office/drawing/2014/main" id="{A303ADB0-C9AC-49F6-9958-5237892F2BBC}"/>
-              </a:ext>
-            </a:extLst>
-          </p:cNvPr>
-          <p:cNvSpPr>
-            <a:spLocks noGrp="1"/>
-          </p:cNvSpPr>
-          <p:nvPr>
-            <p:ph type="title"/>
-          </p:nvPr>
-        </p:nvSpPr>
-        <p:spPr/>
-        <p:txBody>
-          <a:bodyPr/>
-          <a:lstStyle/>
-          <a:p>
-            <a:r>
-              <a:rPr lang="en-US" dirty="0"/>
-              <a:t>simulations</a:t>
-            </a:r>
-            <a:endParaRPr lang="en-GB" dirty="0"/>
-          </a:p>
-        </p:txBody>
-      </p:sp>
-      <p:sp>
-        <p:nvSpPr>
-          <p:cNvPr id="4" name="Slide Number Placeholder 3">
-            <a:extLst>
-              <a:ext uri="{FF2B5EF4-FFF2-40B4-BE49-F238E27FC236}">
-                <a16:creationId xmlns:a16="http://schemas.microsoft.com/office/drawing/2014/main" id="{6672E075-79D5-4C46-B7C1-D9D2DB1F74AC}"/>
-              </a:ext>
-            </a:extLst>
-          </p:cNvPr>
-          <p:cNvSpPr>
-            <a:spLocks noGrp="1"/>
-          </p:cNvSpPr>
-          <p:nvPr>
-            <p:ph type="sldNum" sz="quarter" idx="12"/>
-          </p:nvPr>
-        </p:nvSpPr>
-        <p:spPr/>
-        <p:txBody>
-          <a:bodyPr/>
-          <a:lstStyle/>
-          <a:p>
-            <a:fld id="{7AE184E0-0BD4-4705-A12B-9B71DDE63301}" type="slidenum">
-              <a:rPr lang="en-GB" noProof="0" smtClean="0"/>
-              <a:t>29</a:t>
-            </a:fld>
-            <a:endParaRPr lang="en-GB" noProof="0" dirty="0"/>
-          </a:p>
-        </p:txBody>
-      </p:sp>
-      <p:sp>
-        <p:nvSpPr>
-          <p:cNvPr id="16" name="Content Placeholder 15">
-            <a:extLst>
-              <a:ext uri="{FF2B5EF4-FFF2-40B4-BE49-F238E27FC236}">
-                <a16:creationId xmlns:a16="http://schemas.microsoft.com/office/drawing/2014/main" id="{CCB03C30-2FD0-4D5A-9D19-A4945B1030EE}"/>
-              </a:ext>
-            </a:extLst>
-          </p:cNvPr>
-          <p:cNvSpPr>
-            <a:spLocks noGrp="1"/>
-          </p:cNvSpPr>
-          <p:nvPr>
-            <p:ph idx="1"/>
-          </p:nvPr>
-        </p:nvSpPr>
-        <p:spPr/>
-        <p:txBody>
-          <a:bodyPr/>
-          <a:lstStyle/>
-          <a:p>
-            <a:r>
-              <a:rPr lang="en-US" dirty="0"/>
-              <a:t>Y ~ Bin[ </a:t>
-            </a:r>
-            <a:r>
-              <a:rPr lang="en-US" sz="4800" dirty="0"/>
-              <a:t>{(</a:t>
-            </a:r>
-            <a:r>
-              <a:rPr lang="el-GR" sz="4800" dirty="0"/>
-              <a:t>α</a:t>
-            </a:r>
-            <a:r>
-              <a:rPr lang="en-US" sz="4800" dirty="0"/>
-              <a:t>) + (</a:t>
-            </a:r>
-            <a:r>
-              <a:rPr lang="en-US" sz="4800" i="1" dirty="0"/>
-              <a:t>u</a:t>
-            </a:r>
-            <a:r>
-              <a:rPr lang="en-US" sz="4800" i="1" baseline="-25000" dirty="0"/>
-              <a:t>1</a:t>
-            </a:r>
-            <a:r>
-              <a:rPr lang="en-US" sz="4800" dirty="0"/>
-              <a:t>|pp)} + </a:t>
-            </a:r>
-          </a:p>
-          <a:p>
-            <a:pPr marL="86400" indent="0">
-              <a:buNone/>
-            </a:pPr>
-            <a:r>
-              <a:rPr lang="en-US" sz="4800" dirty="0"/>
-              <a:t>					   {(</a:t>
-            </a:r>
-            <a:r>
-              <a:rPr lang="el-GR" sz="4800" dirty="0"/>
-              <a:t>β</a:t>
-            </a:r>
-            <a:r>
-              <a:rPr lang="en-US" sz="4800" dirty="0"/>
-              <a:t>) + (</a:t>
-            </a:r>
-            <a:r>
-              <a:rPr lang="en-US" sz="4800" i="1" dirty="0"/>
-              <a:t>u</a:t>
-            </a:r>
-            <a:r>
-              <a:rPr lang="en-US" sz="4800" i="1" baseline="-25000" dirty="0"/>
-              <a:t>2</a:t>
-            </a:r>
-            <a:r>
-              <a:rPr lang="en-US" sz="4800" dirty="0"/>
-              <a:t>|pp)} * EV]</a:t>
-            </a:r>
-            <a:endParaRPr lang="en-GB" dirty="0"/>
-          </a:p>
-          <a:p>
-            <a:endParaRPr lang="en-GB" dirty="0"/>
-          </a:p>
-        </p:txBody>
-      </p:sp>
-      <p:pic>
-        <p:nvPicPr>
-          <p:cNvPr id="17" name="Picture 16">
-            <a:extLst>
-              <a:ext uri="{FF2B5EF4-FFF2-40B4-BE49-F238E27FC236}">
-                <a16:creationId xmlns:a16="http://schemas.microsoft.com/office/drawing/2014/main" id="{0F1DCEA2-43A5-4846-831D-34E2C5A3C7BE}"/>
-              </a:ext>
-            </a:extLst>
-          </p:cNvPr>
-          <p:cNvPicPr>
-            <a:picLocks noChangeAspect="1"/>
-          </p:cNvPicPr>
-          <p:nvPr/>
-        </p:nvPicPr>
-        <p:blipFill>
-          <a:blip r:embed="rId2"/>
-          <a:stretch>
-            <a:fillRect/>
-          </a:stretch>
-        </p:blipFill>
-        <p:spPr>
-          <a:xfrm>
-            <a:off x="2025799" y="3131962"/>
-            <a:ext cx="13313920" cy="4368449"/>
-          </a:xfrm>
-          <a:prstGeom prst="rect">
-            <a:avLst/>
-          </a:prstGeom>
-        </p:spPr>
-      </p:pic>
-      <p:sp>
-        <p:nvSpPr>
-          <p:cNvPr id="18" name="TextBox 17">
-            <a:extLst>
-              <a:ext uri="{FF2B5EF4-FFF2-40B4-BE49-F238E27FC236}">
-                <a16:creationId xmlns:a16="http://schemas.microsoft.com/office/drawing/2014/main" id="{CB01C7D7-6D36-4109-8B21-A18177180D21}"/>
-              </a:ext>
-            </a:extLst>
-          </p:cNvPr>
-          <p:cNvSpPr txBox="1"/>
-          <p:nvPr/>
-        </p:nvSpPr>
-        <p:spPr>
-          <a:xfrm>
-            <a:off x="10117777" y="8437088"/>
-            <a:ext cx="5038296" cy="511615"/>
-          </a:xfrm>
-          <a:prstGeom prst="rect">
-            <a:avLst/>
-          </a:prstGeom>
-          <a:noFill/>
-        </p:spPr>
-        <p:txBody>
-          <a:bodyPr wrap="square" rtlCol="0">
-            <a:spAutoFit/>
-          </a:bodyPr>
-          <a:lstStyle/>
-          <a:p>
-            <a:pPr algn="l">
-              <a:lnSpc>
-                <a:spcPct val="120000"/>
-              </a:lnSpc>
-            </a:pPr>
-            <a:r>
-              <a:rPr lang="en-US" sz="2500" dirty="0"/>
-              <a:t>BF (EV vs linear) = 8.53*10</a:t>
-            </a:r>
-            <a:r>
-              <a:rPr lang="en-US" sz="2500" baseline="30000" dirty="0"/>
-              <a:t>27</a:t>
-            </a:r>
-            <a:r>
-              <a:rPr lang="en-US" sz="2500" dirty="0"/>
-              <a:t>  </a:t>
-            </a:r>
-            <a:endParaRPr lang="en-GB" sz="2500" dirty="0"/>
-          </a:p>
-        </p:txBody>
-      </p:sp>
-      <p:sp>
-        <p:nvSpPr>
-          <p:cNvPr id="19" name="TextBox 18">
-            <a:extLst>
-              <a:ext uri="{FF2B5EF4-FFF2-40B4-BE49-F238E27FC236}">
-                <a16:creationId xmlns:a16="http://schemas.microsoft.com/office/drawing/2014/main" id="{881F5FA2-422A-4BED-AE46-CD3C214D9AFC}"/>
-              </a:ext>
-            </a:extLst>
-          </p:cNvPr>
-          <p:cNvSpPr txBox="1"/>
-          <p:nvPr/>
-        </p:nvSpPr>
-        <p:spPr>
-          <a:xfrm>
-            <a:off x="10117777" y="7766462"/>
-            <a:ext cx="4096987" cy="511615"/>
-          </a:xfrm>
-          <a:prstGeom prst="rect">
-            <a:avLst/>
-          </a:prstGeom>
-          <a:noFill/>
-        </p:spPr>
-        <p:txBody>
-          <a:bodyPr wrap="square" rtlCol="0">
-            <a:spAutoFit/>
-          </a:bodyPr>
-          <a:lstStyle/>
-          <a:p>
-            <a:pPr algn="l">
-              <a:lnSpc>
-                <a:spcPct val="120000"/>
-              </a:lnSpc>
-            </a:pPr>
-            <a:r>
-              <a:rPr lang="en-US" sz="2500" dirty="0"/>
-              <a:t>For 5 pp: </a:t>
-            </a:r>
-            <a:r>
-              <a:rPr lang="en-US" sz="2500" dirty="0">
-                <a:solidFill>
-                  <a:srgbClr val="92D050"/>
-                </a:solidFill>
-              </a:rPr>
-              <a:t>14</a:t>
-            </a:r>
-            <a:r>
-              <a:rPr lang="en-US" sz="2500" dirty="0">
-                <a:solidFill>
-                  <a:schemeClr val="accent1"/>
-                </a:solidFill>
-              </a:rPr>
-              <a:t> </a:t>
-            </a:r>
-            <a:r>
-              <a:rPr lang="en-US" sz="2500" dirty="0"/>
-              <a:t>parameters</a:t>
-            </a:r>
-            <a:endParaRPr lang="en-GB" sz="2500" dirty="0"/>
-          </a:p>
-        </p:txBody>
-      </p:sp>
-    </p:spTree>
-    <p:extLst>
-      <p:ext uri="{BB962C8B-B14F-4D97-AF65-F5344CB8AC3E}">
-        <p14:creationId xmlns:p14="http://schemas.microsoft.com/office/powerpoint/2010/main" val="2956637924"/>
-      </p:ext>
-    </p:extLst>
-  </p:cSld>
-  <p:clrMapOvr>
-    <a:masterClrMapping/>
-  </p:clrMapOvr>
 </p:sld>
 </file>
 
@@ -13059,6 +13369,1101 @@
           <p:cNvPr id="2" name="Title 1">
             <a:extLst>
               <a:ext uri="{FF2B5EF4-FFF2-40B4-BE49-F238E27FC236}">
+                <a16:creationId xmlns:a16="http://schemas.microsoft.com/office/drawing/2014/main" id="{DFDFB59F-ECB8-492E-9D5D-07AA7DEF6793}"/>
+              </a:ext>
+            </a:extLst>
+          </p:cNvPr>
+          <p:cNvSpPr>
+            <a:spLocks noGrp="1"/>
+          </p:cNvSpPr>
+          <p:nvPr>
+            <p:ph type="title"/>
+          </p:nvPr>
+        </p:nvSpPr>
+        <p:spPr/>
+        <p:txBody>
+          <a:bodyPr/>
+          <a:lstStyle/>
+          <a:p>
+            <a:r>
+              <a:rPr lang="en-US" dirty="0"/>
+              <a:t>simulations</a:t>
+            </a:r>
+            <a:endParaRPr lang="en-GB" dirty="0"/>
+          </a:p>
+        </p:txBody>
+      </p:sp>
+      <p:sp>
+        <p:nvSpPr>
+          <p:cNvPr id="3" name="Content Placeholder 2">
+            <a:extLst>
+              <a:ext uri="{FF2B5EF4-FFF2-40B4-BE49-F238E27FC236}">
+                <a16:creationId xmlns:a16="http://schemas.microsoft.com/office/drawing/2014/main" id="{86EF79FC-4FF1-4D06-8A24-9A943F10BB29}"/>
+              </a:ext>
+            </a:extLst>
+          </p:cNvPr>
+          <p:cNvSpPr>
+            <a:spLocks noGrp="1"/>
+          </p:cNvSpPr>
+          <p:nvPr>
+            <p:ph idx="1"/>
+          </p:nvPr>
+        </p:nvSpPr>
+        <p:spPr/>
+        <p:txBody>
+          <a:bodyPr/>
+          <a:lstStyle/>
+          <a:p>
+            <a:r>
+              <a:rPr lang="en-US" dirty="0"/>
+              <a:t>Linear</a:t>
+            </a:r>
+            <a:endParaRPr lang="en-GB" dirty="0"/>
+          </a:p>
+        </p:txBody>
+      </p:sp>
+      <p:sp>
+        <p:nvSpPr>
+          <p:cNvPr id="4" name="Slide Number Placeholder 3">
+            <a:extLst>
+              <a:ext uri="{FF2B5EF4-FFF2-40B4-BE49-F238E27FC236}">
+                <a16:creationId xmlns:a16="http://schemas.microsoft.com/office/drawing/2014/main" id="{3401F741-951D-4B91-9FA6-A8C1BF82C48D}"/>
+              </a:ext>
+            </a:extLst>
+          </p:cNvPr>
+          <p:cNvSpPr>
+            <a:spLocks noGrp="1"/>
+          </p:cNvSpPr>
+          <p:nvPr>
+            <p:ph type="sldNum" sz="quarter" idx="12"/>
+          </p:nvPr>
+        </p:nvSpPr>
+        <p:spPr/>
+        <p:txBody>
+          <a:bodyPr/>
+          <a:lstStyle/>
+          <a:p>
+            <a:fld id="{7AE184E0-0BD4-4705-A12B-9B71DDE63301}" type="slidenum">
+              <a:rPr lang="en-GB" noProof="0" smtClean="0"/>
+              <a:t>30</a:t>
+            </a:fld>
+            <a:endParaRPr lang="en-GB" noProof="0" dirty="0"/>
+          </a:p>
+        </p:txBody>
+      </p:sp>
+      <p:pic>
+        <p:nvPicPr>
+          <p:cNvPr id="5" name="Picture 4">
+            <a:extLst>
+              <a:ext uri="{FF2B5EF4-FFF2-40B4-BE49-F238E27FC236}">
+                <a16:creationId xmlns:a16="http://schemas.microsoft.com/office/drawing/2014/main" id="{885AC243-DC67-47DB-981F-E82D329F8A9F}"/>
+              </a:ext>
+            </a:extLst>
+          </p:cNvPr>
+          <p:cNvPicPr>
+            <a:picLocks noChangeAspect="1"/>
+          </p:cNvPicPr>
+          <p:nvPr/>
+        </p:nvPicPr>
+        <p:blipFill>
+          <a:blip r:embed="rId2"/>
+          <a:stretch>
+            <a:fillRect/>
+          </a:stretch>
+        </p:blipFill>
+        <p:spPr>
+          <a:xfrm>
+            <a:off x="2265728" y="2775703"/>
+            <a:ext cx="12807217" cy="4202194"/>
+          </a:xfrm>
+          <a:prstGeom prst="rect">
+            <a:avLst/>
+          </a:prstGeom>
+        </p:spPr>
+      </p:pic>
+      <p:sp>
+        <p:nvSpPr>
+          <p:cNvPr id="6" name="TextBox 5">
+            <a:extLst>
+              <a:ext uri="{FF2B5EF4-FFF2-40B4-BE49-F238E27FC236}">
+                <a16:creationId xmlns:a16="http://schemas.microsoft.com/office/drawing/2014/main" id="{1D443B91-4A6F-438B-A97D-339E157E2FE7}"/>
+              </a:ext>
+            </a:extLst>
+          </p:cNvPr>
+          <p:cNvSpPr txBox="1"/>
+          <p:nvPr/>
+        </p:nvSpPr>
+        <p:spPr>
+          <a:xfrm>
+            <a:off x="10034649" y="7077694"/>
+            <a:ext cx="5038296" cy="511615"/>
+          </a:xfrm>
+          <a:prstGeom prst="rect">
+            <a:avLst/>
+          </a:prstGeom>
+          <a:noFill/>
+        </p:spPr>
+        <p:txBody>
+          <a:bodyPr wrap="square" rtlCol="0">
+            <a:spAutoFit/>
+          </a:bodyPr>
+          <a:lstStyle/>
+          <a:p>
+            <a:pPr algn="l">
+              <a:lnSpc>
+                <a:spcPct val="120000"/>
+              </a:lnSpc>
+            </a:pPr>
+            <a:r>
+              <a:rPr lang="en-US" sz="2500" dirty="0"/>
+              <a:t>BF (linear vs spline) = 506.62  </a:t>
+            </a:r>
+            <a:endParaRPr lang="en-GB" sz="2500" dirty="0"/>
+          </a:p>
+        </p:txBody>
+      </p:sp>
+      <p:sp>
+        <p:nvSpPr>
+          <p:cNvPr id="7" name="TextBox 6">
+            <a:extLst>
+              <a:ext uri="{FF2B5EF4-FFF2-40B4-BE49-F238E27FC236}">
+                <a16:creationId xmlns:a16="http://schemas.microsoft.com/office/drawing/2014/main" id="{88063706-F098-4315-8123-EA3D249F4395}"/>
+              </a:ext>
+            </a:extLst>
+          </p:cNvPr>
+          <p:cNvSpPr txBox="1"/>
+          <p:nvPr/>
+        </p:nvSpPr>
+        <p:spPr>
+          <a:xfrm>
+            <a:off x="10117777" y="7766462"/>
+            <a:ext cx="4096987" cy="511615"/>
+          </a:xfrm>
+          <a:prstGeom prst="rect">
+            <a:avLst/>
+          </a:prstGeom>
+          <a:noFill/>
+        </p:spPr>
+        <p:txBody>
+          <a:bodyPr wrap="square" rtlCol="0">
+            <a:spAutoFit/>
+          </a:bodyPr>
+          <a:lstStyle/>
+          <a:p>
+            <a:pPr algn="l">
+              <a:lnSpc>
+                <a:spcPct val="120000"/>
+              </a:lnSpc>
+            </a:pPr>
+            <a:r>
+              <a:rPr lang="en-US" sz="2500" dirty="0"/>
+              <a:t>For 5 pp: </a:t>
+            </a:r>
+            <a:r>
+              <a:rPr lang="en-US" sz="2500" dirty="0">
+                <a:solidFill>
+                  <a:schemeClr val="accent1"/>
+                </a:solidFill>
+              </a:rPr>
+              <a:t>217 </a:t>
+            </a:r>
+            <a:r>
+              <a:rPr lang="en-US" sz="2500" dirty="0"/>
+              <a:t>parameters</a:t>
+            </a:r>
+            <a:endParaRPr lang="en-GB" sz="2500" dirty="0"/>
+          </a:p>
+        </p:txBody>
+      </p:sp>
+    </p:spTree>
+    <p:extLst>
+      <p:ext uri="{BB962C8B-B14F-4D97-AF65-F5344CB8AC3E}">
+        <p14:creationId xmlns:p14="http://schemas.microsoft.com/office/powerpoint/2010/main" val="3095457027"/>
+      </p:ext>
+    </p:extLst>
+  </p:cSld>
+  <p:clrMapOvr>
+    <a:masterClrMapping/>
+  </p:clrMapOvr>
+  <p:timing>
+    <p:tnLst>
+      <p:par>
+        <p:cTn id="1" dur="indefinite" restart="never" nodeType="tmRoot">
+          <p:childTnLst>
+            <p:seq concurrent="1" nextAc="seek">
+              <p:cTn id="2" dur="indefinite" nodeType="mainSeq">
+                <p:childTnLst>
+                  <p:par>
+                    <p:cTn id="3" fill="hold">
+                      <p:stCondLst>
+                        <p:cond delay="indefinite"/>
+                      </p:stCondLst>
+                      <p:childTnLst>
+                        <p:par>
+                          <p:cTn id="4" fill="hold">
+                            <p:stCondLst>
+                              <p:cond delay="0"/>
+                            </p:stCondLst>
+                            <p:childTnLst>
+                              <p:par>
+                                <p:cTn id="5" presetID="1" presetClass="entr" presetSubtype="0" fill="hold" nodeType="clickEffect">
+                                  <p:stCondLst>
+                                    <p:cond delay="0"/>
+                                  </p:stCondLst>
+                                  <p:childTnLst>
+                                    <p:set>
+                                      <p:cBhvr>
+                                        <p:cTn id="6" dur="1" fill="hold">
+                                          <p:stCondLst>
+                                            <p:cond delay="0"/>
+                                          </p:stCondLst>
+                                        </p:cTn>
+                                        <p:tgtEl>
+                                          <p:spTgt spid="5"/>
+                                        </p:tgtEl>
+                                        <p:attrNameLst>
+                                          <p:attrName>style.visibility</p:attrName>
+                                        </p:attrNameLst>
+                                      </p:cBhvr>
+                                      <p:to>
+                                        <p:strVal val="visible"/>
+                                      </p:to>
+                                    </p:set>
+                                  </p:childTnLst>
+                                </p:cTn>
+                              </p:par>
+                            </p:childTnLst>
+                          </p:cTn>
+                        </p:par>
+                      </p:childTnLst>
+                    </p:cTn>
+                  </p:par>
+                </p:childTnLst>
+              </p:cTn>
+              <p:prevCondLst>
+                <p:cond evt="onPrev" delay="0">
+                  <p:tgtEl>
+                    <p:sldTgt/>
+                  </p:tgtEl>
+                </p:cond>
+              </p:prevCondLst>
+              <p:nextCondLst>
+                <p:cond evt="onNext" delay="0">
+                  <p:tgtEl>
+                    <p:sldTgt/>
+                  </p:tgtEl>
+                </p:cond>
+              </p:nextCondLst>
+            </p:seq>
+          </p:childTnLst>
+        </p:cTn>
+      </p:par>
+    </p:tnLst>
+  </p:timing>
+</p:sld>
+</file>
+
+<file path=ppt/slides/slide31.xml><?xml version="1.0" encoding="utf-8"?>
+<p:sld xmlns:a="http://schemas.openxmlformats.org/drawingml/2006/main" xmlns:r="http://schemas.openxmlformats.org/officeDocument/2006/relationships" xmlns:p="http://schemas.openxmlformats.org/presentationml/2006/main">
+  <p:cSld>
+    <p:spTree>
+      <p:nvGrpSpPr>
+        <p:cNvPr id="1" name=""/>
+        <p:cNvGrpSpPr/>
+        <p:nvPr/>
+      </p:nvGrpSpPr>
+      <p:grpSpPr>
+        <a:xfrm>
+          <a:off x="0" y="0"/>
+          <a:ext cx="0" cy="0"/>
+          <a:chOff x="0" y="0"/>
+          <a:chExt cx="0" cy="0"/>
+        </a:xfrm>
+      </p:grpSpPr>
+      <p:sp>
+        <p:nvSpPr>
+          <p:cNvPr id="2" name="Title 1">
+            <a:extLst>
+              <a:ext uri="{FF2B5EF4-FFF2-40B4-BE49-F238E27FC236}">
+                <a16:creationId xmlns:a16="http://schemas.microsoft.com/office/drawing/2014/main" id="{E10A4AEC-9B8E-4FD0-A57F-34CA7C025331}"/>
+              </a:ext>
+            </a:extLst>
+          </p:cNvPr>
+          <p:cNvSpPr>
+            <a:spLocks noGrp="1"/>
+          </p:cNvSpPr>
+          <p:nvPr>
+            <p:ph type="title"/>
+          </p:nvPr>
+        </p:nvSpPr>
+        <p:spPr/>
+        <p:txBody>
+          <a:bodyPr/>
+          <a:lstStyle/>
+          <a:p>
+            <a:r>
+              <a:rPr lang="en-US" dirty="0"/>
+              <a:t>Simulations</a:t>
+            </a:r>
+            <a:endParaRPr lang="en-GB" dirty="0"/>
+          </a:p>
+        </p:txBody>
+      </p:sp>
+      <p:sp>
+        <p:nvSpPr>
+          <p:cNvPr id="3" name="Content Placeholder 2">
+            <a:extLst>
+              <a:ext uri="{FF2B5EF4-FFF2-40B4-BE49-F238E27FC236}">
+                <a16:creationId xmlns:a16="http://schemas.microsoft.com/office/drawing/2014/main" id="{ABC40EDC-5E92-40FC-A5FE-0F2EBEEF3E3B}"/>
+              </a:ext>
+            </a:extLst>
+          </p:cNvPr>
+          <p:cNvSpPr>
+            <a:spLocks noGrp="1"/>
+          </p:cNvSpPr>
+          <p:nvPr>
+            <p:ph idx="1"/>
+          </p:nvPr>
+        </p:nvSpPr>
+        <p:spPr/>
+        <p:txBody>
+          <a:bodyPr/>
+          <a:lstStyle/>
+          <a:p>
+            <a:r>
+              <a:rPr lang="en-US" dirty="0"/>
+              <a:t>Improve with &amp; test theoretical effect?</a:t>
+            </a:r>
+            <a:endParaRPr lang="en-GB" dirty="0"/>
+          </a:p>
+        </p:txBody>
+      </p:sp>
+      <p:sp>
+        <p:nvSpPr>
+          <p:cNvPr id="4" name="Slide Number Placeholder 3">
+            <a:extLst>
+              <a:ext uri="{FF2B5EF4-FFF2-40B4-BE49-F238E27FC236}">
+                <a16:creationId xmlns:a16="http://schemas.microsoft.com/office/drawing/2014/main" id="{11D68AEF-C2AF-4103-B501-8623DEA6C588}"/>
+              </a:ext>
+            </a:extLst>
+          </p:cNvPr>
+          <p:cNvSpPr>
+            <a:spLocks noGrp="1"/>
+          </p:cNvSpPr>
+          <p:nvPr>
+            <p:ph type="sldNum" sz="quarter" idx="12"/>
+          </p:nvPr>
+        </p:nvSpPr>
+        <p:spPr/>
+        <p:txBody>
+          <a:bodyPr/>
+          <a:lstStyle/>
+          <a:p>
+            <a:fld id="{7AE184E0-0BD4-4705-A12B-9B71DDE63301}" type="slidenum">
+              <a:rPr lang="en-GB" noProof="0" smtClean="0"/>
+              <a:t>31</a:t>
+            </a:fld>
+            <a:endParaRPr lang="en-GB" noProof="0" dirty="0"/>
+          </a:p>
+        </p:txBody>
+      </p:sp>
+      <p:pic>
+        <p:nvPicPr>
+          <p:cNvPr id="7" name="Picture 6">
+            <a:extLst>
+              <a:ext uri="{FF2B5EF4-FFF2-40B4-BE49-F238E27FC236}">
+                <a16:creationId xmlns:a16="http://schemas.microsoft.com/office/drawing/2014/main" id="{E0767344-0C20-4CC7-83E7-B7F1C9A1A591}"/>
+              </a:ext>
+            </a:extLst>
+          </p:cNvPr>
+          <p:cNvPicPr>
+            <a:picLocks noChangeAspect="1"/>
+          </p:cNvPicPr>
+          <p:nvPr/>
+        </p:nvPicPr>
+        <p:blipFill>
+          <a:blip r:embed="rId2"/>
+          <a:stretch>
+            <a:fillRect/>
+          </a:stretch>
+        </p:blipFill>
+        <p:spPr>
+          <a:xfrm>
+            <a:off x="2790702" y="2064599"/>
+            <a:ext cx="12496160" cy="5904436"/>
+          </a:xfrm>
+          <a:prstGeom prst="rect">
+            <a:avLst/>
+          </a:prstGeom>
+        </p:spPr>
+      </p:pic>
+    </p:spTree>
+    <p:extLst>
+      <p:ext uri="{BB962C8B-B14F-4D97-AF65-F5344CB8AC3E}">
+        <p14:creationId xmlns:p14="http://schemas.microsoft.com/office/powerpoint/2010/main" val="4170585177"/>
+      </p:ext>
+    </p:extLst>
+  </p:cSld>
+  <p:clrMapOvr>
+    <a:masterClrMapping/>
+  </p:clrMapOvr>
+  <p:timing>
+    <p:tnLst>
+      <p:par>
+        <p:cTn id="1" dur="indefinite" restart="never" nodeType="tmRoot">
+          <p:childTnLst>
+            <p:seq concurrent="1" nextAc="seek">
+              <p:cTn id="2" dur="indefinite" nodeType="mainSeq">
+                <p:childTnLst>
+                  <p:par>
+                    <p:cTn id="3" fill="hold">
+                      <p:stCondLst>
+                        <p:cond delay="indefinite"/>
+                      </p:stCondLst>
+                      <p:childTnLst>
+                        <p:par>
+                          <p:cTn id="4" fill="hold">
+                            <p:stCondLst>
+                              <p:cond delay="0"/>
+                            </p:stCondLst>
+                            <p:childTnLst>
+                              <p:par>
+                                <p:cTn id="5" presetID="1" presetClass="entr" presetSubtype="0" fill="hold" nodeType="clickEffect">
+                                  <p:stCondLst>
+                                    <p:cond delay="0"/>
+                                  </p:stCondLst>
+                                  <p:childTnLst>
+                                    <p:set>
+                                      <p:cBhvr>
+                                        <p:cTn id="6" dur="1" fill="hold">
+                                          <p:stCondLst>
+                                            <p:cond delay="0"/>
+                                          </p:stCondLst>
+                                        </p:cTn>
+                                        <p:tgtEl>
+                                          <p:spTgt spid="7"/>
+                                        </p:tgtEl>
+                                        <p:attrNameLst>
+                                          <p:attrName>style.visibility</p:attrName>
+                                        </p:attrNameLst>
+                                      </p:cBhvr>
+                                      <p:to>
+                                        <p:strVal val="visible"/>
+                                      </p:to>
+                                    </p:set>
+                                  </p:childTnLst>
+                                </p:cTn>
+                              </p:par>
+                            </p:childTnLst>
+                          </p:cTn>
+                        </p:par>
+                      </p:childTnLst>
+                    </p:cTn>
+                  </p:par>
+                </p:childTnLst>
+              </p:cTn>
+              <p:prevCondLst>
+                <p:cond evt="onPrev" delay="0">
+                  <p:tgtEl>
+                    <p:sldTgt/>
+                  </p:tgtEl>
+                </p:cond>
+              </p:prevCondLst>
+              <p:nextCondLst>
+                <p:cond evt="onNext" delay="0">
+                  <p:tgtEl>
+                    <p:sldTgt/>
+                  </p:tgtEl>
+                </p:cond>
+              </p:nextCondLst>
+            </p:seq>
+          </p:childTnLst>
+        </p:cTn>
+      </p:par>
+    </p:tnLst>
+  </p:timing>
+</p:sld>
+</file>
+
+<file path=ppt/slides/slide32.xml><?xml version="1.0" encoding="utf-8"?>
+<p:sld xmlns:a="http://schemas.openxmlformats.org/drawingml/2006/main" xmlns:r="http://schemas.openxmlformats.org/officeDocument/2006/relationships" xmlns:p="http://schemas.openxmlformats.org/presentationml/2006/main">
+  <p:cSld>
+    <p:spTree>
+      <p:nvGrpSpPr>
+        <p:cNvPr id="1" name=""/>
+        <p:cNvGrpSpPr/>
+        <p:nvPr/>
+      </p:nvGrpSpPr>
+      <p:grpSpPr>
+        <a:xfrm>
+          <a:off x="0" y="0"/>
+          <a:ext cx="0" cy="0"/>
+          <a:chOff x="0" y="0"/>
+          <a:chExt cx="0" cy="0"/>
+        </a:xfrm>
+      </p:grpSpPr>
+      <p:sp>
+        <p:nvSpPr>
+          <p:cNvPr id="2" name="Title 1">
+            <a:extLst>
+              <a:ext uri="{FF2B5EF4-FFF2-40B4-BE49-F238E27FC236}">
+                <a16:creationId xmlns:a16="http://schemas.microsoft.com/office/drawing/2014/main" id="{A303ADB0-C9AC-49F6-9958-5237892F2BBC}"/>
+              </a:ext>
+            </a:extLst>
+          </p:cNvPr>
+          <p:cNvSpPr>
+            <a:spLocks noGrp="1"/>
+          </p:cNvSpPr>
+          <p:nvPr>
+            <p:ph type="title"/>
+          </p:nvPr>
+        </p:nvSpPr>
+        <p:spPr/>
+        <p:txBody>
+          <a:bodyPr/>
+          <a:lstStyle/>
+          <a:p>
+            <a:r>
+              <a:rPr lang="en-US" dirty="0"/>
+              <a:t>simulations</a:t>
+            </a:r>
+            <a:endParaRPr lang="en-GB" dirty="0"/>
+          </a:p>
+        </p:txBody>
+      </p:sp>
+      <p:sp>
+        <p:nvSpPr>
+          <p:cNvPr id="4" name="Slide Number Placeholder 3">
+            <a:extLst>
+              <a:ext uri="{FF2B5EF4-FFF2-40B4-BE49-F238E27FC236}">
+                <a16:creationId xmlns:a16="http://schemas.microsoft.com/office/drawing/2014/main" id="{6672E075-79D5-4C46-B7C1-D9D2DB1F74AC}"/>
+              </a:ext>
+            </a:extLst>
+          </p:cNvPr>
+          <p:cNvSpPr>
+            <a:spLocks noGrp="1"/>
+          </p:cNvSpPr>
+          <p:nvPr>
+            <p:ph type="sldNum" sz="quarter" idx="12"/>
+          </p:nvPr>
+        </p:nvSpPr>
+        <p:spPr/>
+        <p:txBody>
+          <a:bodyPr/>
+          <a:lstStyle/>
+          <a:p>
+            <a:fld id="{7AE184E0-0BD4-4705-A12B-9B71DDE63301}" type="slidenum">
+              <a:rPr lang="en-GB" noProof="0" smtClean="0"/>
+              <a:t>32</a:t>
+            </a:fld>
+            <a:endParaRPr lang="en-GB" noProof="0" dirty="0"/>
+          </a:p>
+        </p:txBody>
+      </p:sp>
+      <p:sp>
+        <p:nvSpPr>
+          <p:cNvPr id="16" name="Content Placeholder 15">
+            <a:extLst>
+              <a:ext uri="{FF2B5EF4-FFF2-40B4-BE49-F238E27FC236}">
+                <a16:creationId xmlns:a16="http://schemas.microsoft.com/office/drawing/2014/main" id="{CCB03C30-2FD0-4D5A-9D19-A4945B1030EE}"/>
+              </a:ext>
+            </a:extLst>
+          </p:cNvPr>
+          <p:cNvSpPr>
+            <a:spLocks noGrp="1"/>
+          </p:cNvSpPr>
+          <p:nvPr>
+            <p:ph idx="1"/>
+          </p:nvPr>
+        </p:nvSpPr>
+        <p:spPr/>
+        <p:txBody>
+          <a:bodyPr/>
+          <a:lstStyle/>
+          <a:p>
+            <a:r>
+              <a:rPr lang="en-US" dirty="0"/>
+              <a:t>Y ~ Bern[ </a:t>
+            </a:r>
+            <a:r>
+              <a:rPr lang="en-US" sz="4800" dirty="0"/>
+              <a:t>{(</a:t>
+            </a:r>
+            <a:r>
+              <a:rPr lang="el-GR" sz="4800" dirty="0"/>
+              <a:t>α</a:t>
+            </a:r>
+            <a:r>
+              <a:rPr lang="en-US" sz="4800" dirty="0"/>
+              <a:t>) + (</a:t>
+            </a:r>
+            <a:r>
+              <a:rPr lang="en-US" sz="4800" i="1" dirty="0"/>
+              <a:t>u</a:t>
+            </a:r>
+            <a:r>
+              <a:rPr lang="en-US" sz="4800" i="1" baseline="-25000" dirty="0"/>
+              <a:t>1</a:t>
+            </a:r>
+            <a:r>
+              <a:rPr lang="en-US" sz="4800" dirty="0"/>
+              <a:t>|pp)} + </a:t>
+            </a:r>
+          </a:p>
+          <a:p>
+            <a:pPr marL="86400" indent="0">
+              <a:buNone/>
+            </a:pPr>
+            <a:r>
+              <a:rPr lang="en-US" sz="4800" dirty="0"/>
+              <a:t>					   {(</a:t>
+            </a:r>
+            <a:r>
+              <a:rPr lang="el-GR" sz="4800" dirty="0"/>
+              <a:t>β</a:t>
+            </a:r>
+            <a:r>
+              <a:rPr lang="en-US" sz="4800" dirty="0"/>
+              <a:t>) + (</a:t>
+            </a:r>
+            <a:r>
+              <a:rPr lang="en-US" sz="4800" i="1" dirty="0"/>
+              <a:t>u</a:t>
+            </a:r>
+            <a:r>
+              <a:rPr lang="en-US" sz="4800" i="1" baseline="-25000" dirty="0"/>
+              <a:t>2</a:t>
+            </a:r>
+            <a:r>
+              <a:rPr lang="en-US" sz="4800" dirty="0"/>
+              <a:t>|pp)} * EV]</a:t>
+            </a:r>
+            <a:endParaRPr lang="en-GB" dirty="0"/>
+          </a:p>
+          <a:p>
+            <a:endParaRPr lang="en-GB" dirty="0"/>
+          </a:p>
+        </p:txBody>
+      </p:sp>
+      <p:pic>
+        <p:nvPicPr>
+          <p:cNvPr id="17" name="Picture 16">
+            <a:extLst>
+              <a:ext uri="{FF2B5EF4-FFF2-40B4-BE49-F238E27FC236}">
+                <a16:creationId xmlns:a16="http://schemas.microsoft.com/office/drawing/2014/main" id="{0F1DCEA2-43A5-4846-831D-34E2C5A3C7BE}"/>
+              </a:ext>
+            </a:extLst>
+          </p:cNvPr>
+          <p:cNvPicPr>
+            <a:picLocks noChangeAspect="1"/>
+          </p:cNvPicPr>
+          <p:nvPr/>
+        </p:nvPicPr>
+        <p:blipFill>
+          <a:blip r:embed="rId2"/>
+          <a:stretch>
+            <a:fillRect/>
+          </a:stretch>
+        </p:blipFill>
+        <p:spPr>
+          <a:xfrm>
+            <a:off x="2025799" y="3131962"/>
+            <a:ext cx="13313920" cy="4368449"/>
+          </a:xfrm>
+          <a:prstGeom prst="rect">
+            <a:avLst/>
+          </a:prstGeom>
+        </p:spPr>
+      </p:pic>
+      <p:pic>
+        <p:nvPicPr>
+          <p:cNvPr id="3" name="Picture 2">
+            <a:extLst>
+              <a:ext uri="{FF2B5EF4-FFF2-40B4-BE49-F238E27FC236}">
+                <a16:creationId xmlns:a16="http://schemas.microsoft.com/office/drawing/2014/main" id="{0A4993BD-FFD7-4CB6-B944-1A02B8896FCA}"/>
+              </a:ext>
+            </a:extLst>
+          </p:cNvPr>
+          <p:cNvPicPr>
+            <a:picLocks noChangeAspect="1"/>
+          </p:cNvPicPr>
+          <p:nvPr/>
+        </p:nvPicPr>
+        <p:blipFill>
+          <a:blip r:embed="rId3"/>
+          <a:stretch>
+            <a:fillRect/>
+          </a:stretch>
+        </p:blipFill>
+        <p:spPr>
+          <a:xfrm>
+            <a:off x="3688315" y="3131962"/>
+            <a:ext cx="11624561" cy="6097770"/>
+          </a:xfrm>
+          <a:prstGeom prst="rect">
+            <a:avLst/>
+          </a:prstGeom>
+        </p:spPr>
+      </p:pic>
+      <p:sp>
+        <p:nvSpPr>
+          <p:cNvPr id="19" name="TextBox 18">
+            <a:extLst>
+              <a:ext uri="{FF2B5EF4-FFF2-40B4-BE49-F238E27FC236}">
+                <a16:creationId xmlns:a16="http://schemas.microsoft.com/office/drawing/2014/main" id="{881F5FA2-422A-4BED-AE46-CD3C214D9AFC}"/>
+              </a:ext>
+            </a:extLst>
+          </p:cNvPr>
+          <p:cNvSpPr txBox="1"/>
+          <p:nvPr/>
+        </p:nvSpPr>
+        <p:spPr>
+          <a:xfrm>
+            <a:off x="10117777" y="7766462"/>
+            <a:ext cx="4096987" cy="511615"/>
+          </a:xfrm>
+          <a:prstGeom prst="rect">
+            <a:avLst/>
+          </a:prstGeom>
+          <a:noFill/>
+        </p:spPr>
+        <p:txBody>
+          <a:bodyPr wrap="square" rtlCol="0">
+            <a:spAutoFit/>
+          </a:bodyPr>
+          <a:lstStyle/>
+          <a:p>
+            <a:pPr algn="l">
+              <a:lnSpc>
+                <a:spcPct val="120000"/>
+              </a:lnSpc>
+            </a:pPr>
+            <a:r>
+              <a:rPr lang="en-US" sz="2500" dirty="0"/>
+              <a:t>For 5 pp: </a:t>
+            </a:r>
+            <a:r>
+              <a:rPr lang="en-US" sz="2500" dirty="0">
+                <a:solidFill>
+                  <a:srgbClr val="92D050"/>
+                </a:solidFill>
+              </a:rPr>
+              <a:t>14</a:t>
+            </a:r>
+            <a:r>
+              <a:rPr lang="en-US" sz="2500" dirty="0">
+                <a:solidFill>
+                  <a:schemeClr val="accent1"/>
+                </a:solidFill>
+              </a:rPr>
+              <a:t> </a:t>
+            </a:r>
+            <a:r>
+              <a:rPr lang="en-US" sz="2500" dirty="0"/>
+              <a:t>parameters</a:t>
+            </a:r>
+            <a:endParaRPr lang="en-GB" sz="2500" dirty="0"/>
+          </a:p>
+        </p:txBody>
+      </p:sp>
+      <p:sp>
+        <p:nvSpPr>
+          <p:cNvPr id="18" name="TextBox 17">
+            <a:extLst>
+              <a:ext uri="{FF2B5EF4-FFF2-40B4-BE49-F238E27FC236}">
+                <a16:creationId xmlns:a16="http://schemas.microsoft.com/office/drawing/2014/main" id="{CB01C7D7-6D36-4109-8B21-A18177180D21}"/>
+              </a:ext>
+            </a:extLst>
+          </p:cNvPr>
+          <p:cNvSpPr txBox="1"/>
+          <p:nvPr/>
+        </p:nvSpPr>
+        <p:spPr>
+          <a:xfrm>
+            <a:off x="10117777" y="8437088"/>
+            <a:ext cx="5038296" cy="511615"/>
+          </a:xfrm>
+          <a:prstGeom prst="rect">
+            <a:avLst/>
+          </a:prstGeom>
+          <a:noFill/>
+        </p:spPr>
+        <p:txBody>
+          <a:bodyPr wrap="square" rtlCol="0">
+            <a:spAutoFit/>
+          </a:bodyPr>
+          <a:lstStyle/>
+          <a:p>
+            <a:pPr algn="l">
+              <a:lnSpc>
+                <a:spcPct val="120000"/>
+              </a:lnSpc>
+            </a:pPr>
+            <a:r>
+              <a:rPr lang="en-US" sz="2500" dirty="0"/>
+              <a:t>BF (EV vs linear) = 8.53*10</a:t>
+            </a:r>
+            <a:r>
+              <a:rPr lang="en-US" sz="2500" baseline="30000" dirty="0"/>
+              <a:t>27</a:t>
+            </a:r>
+            <a:r>
+              <a:rPr lang="en-US" sz="2500" dirty="0"/>
+              <a:t>  </a:t>
+            </a:r>
+            <a:endParaRPr lang="en-GB" sz="2500" dirty="0"/>
+          </a:p>
+        </p:txBody>
+      </p:sp>
+    </p:spTree>
+    <p:extLst>
+      <p:ext uri="{BB962C8B-B14F-4D97-AF65-F5344CB8AC3E}">
+        <p14:creationId xmlns:p14="http://schemas.microsoft.com/office/powerpoint/2010/main" val="2956637924"/>
+      </p:ext>
+    </p:extLst>
+  </p:cSld>
+  <p:clrMapOvr>
+    <a:masterClrMapping/>
+  </p:clrMapOvr>
+  <p:timing>
+    <p:tnLst>
+      <p:par>
+        <p:cTn id="1" dur="indefinite" restart="never" nodeType="tmRoot">
+          <p:childTnLst>
+            <p:seq concurrent="1" nextAc="seek">
+              <p:cTn id="2" dur="indefinite" nodeType="mainSeq">
+                <p:childTnLst>
+                  <p:par>
+                    <p:cTn id="3" fill="hold">
+                      <p:stCondLst>
+                        <p:cond delay="indefinite"/>
+                      </p:stCondLst>
+                      <p:childTnLst>
+                        <p:par>
+                          <p:cTn id="4" fill="hold">
+                            <p:stCondLst>
+                              <p:cond delay="0"/>
+                            </p:stCondLst>
+                            <p:childTnLst>
+                              <p:par>
+                                <p:cTn id="5" presetID="1" presetClass="entr" presetSubtype="0" fill="hold" nodeType="clickEffect">
+                                  <p:stCondLst>
+                                    <p:cond delay="0"/>
+                                  </p:stCondLst>
+                                  <p:childTnLst>
+                                    <p:set>
+                                      <p:cBhvr>
+                                        <p:cTn id="6" dur="1" fill="hold">
+                                          <p:stCondLst>
+                                            <p:cond delay="0"/>
+                                          </p:stCondLst>
+                                        </p:cTn>
+                                        <p:tgtEl>
+                                          <p:spTgt spid="17"/>
+                                        </p:tgtEl>
+                                        <p:attrNameLst>
+                                          <p:attrName>style.visibility</p:attrName>
+                                        </p:attrNameLst>
+                                      </p:cBhvr>
+                                      <p:to>
+                                        <p:strVal val="visible"/>
+                                      </p:to>
+                                    </p:set>
+                                  </p:childTnLst>
+                                </p:cTn>
+                              </p:par>
+                            </p:childTnLst>
+                          </p:cTn>
+                        </p:par>
+                      </p:childTnLst>
+                    </p:cTn>
+                  </p:par>
+                  <p:par>
+                    <p:cTn id="7" fill="hold">
+                      <p:stCondLst>
+                        <p:cond delay="indefinite"/>
+                      </p:stCondLst>
+                      <p:childTnLst>
+                        <p:par>
+                          <p:cTn id="8" fill="hold">
+                            <p:stCondLst>
+                              <p:cond delay="0"/>
+                            </p:stCondLst>
+                            <p:childTnLst>
+                              <p:par>
+                                <p:cTn id="9" presetID="1" presetClass="entr" presetSubtype="0" fill="hold" nodeType="clickEffect">
+                                  <p:stCondLst>
+                                    <p:cond delay="0"/>
+                                  </p:stCondLst>
+                                  <p:childTnLst>
+                                    <p:set>
+                                      <p:cBhvr>
+                                        <p:cTn id="10" dur="1" fill="hold">
+                                          <p:stCondLst>
+                                            <p:cond delay="0"/>
+                                          </p:stCondLst>
+                                        </p:cTn>
+                                        <p:tgtEl>
+                                          <p:spTgt spid="3"/>
+                                        </p:tgtEl>
+                                        <p:attrNameLst>
+                                          <p:attrName>style.visibility</p:attrName>
+                                        </p:attrNameLst>
+                                      </p:cBhvr>
+                                      <p:to>
+                                        <p:strVal val="visible"/>
+                                      </p:to>
+                                    </p:set>
+                                  </p:childTnLst>
+                                </p:cTn>
+                              </p:par>
+                            </p:childTnLst>
+                          </p:cTn>
+                        </p:par>
+                      </p:childTnLst>
+                    </p:cTn>
+                  </p:par>
+                  <p:par>
+                    <p:cTn id="11" fill="hold">
+                      <p:stCondLst>
+                        <p:cond delay="indefinite"/>
+                      </p:stCondLst>
+                      <p:childTnLst>
+                        <p:par>
+                          <p:cTn id="12" fill="hold">
+                            <p:stCondLst>
+                              <p:cond delay="0"/>
+                            </p:stCondLst>
+                            <p:childTnLst>
+                              <p:par>
+                                <p:cTn id="13" presetID="1" presetClass="entr" presetSubtype="0" fill="hold" grpId="0" nodeType="clickEffect">
+                                  <p:stCondLst>
+                                    <p:cond delay="0"/>
+                                  </p:stCondLst>
+                                  <p:childTnLst>
+                                    <p:set>
+                                      <p:cBhvr>
+                                        <p:cTn id="14" dur="1" fill="hold">
+                                          <p:stCondLst>
+                                            <p:cond delay="0"/>
+                                          </p:stCondLst>
+                                        </p:cTn>
+                                        <p:tgtEl>
+                                          <p:spTgt spid="19"/>
+                                        </p:tgtEl>
+                                        <p:attrNameLst>
+                                          <p:attrName>style.visibility</p:attrName>
+                                        </p:attrNameLst>
+                                      </p:cBhvr>
+                                      <p:to>
+                                        <p:strVal val="visible"/>
+                                      </p:to>
+                                    </p:set>
+                                  </p:childTnLst>
+                                </p:cTn>
+                              </p:par>
+                            </p:childTnLst>
+                          </p:cTn>
+                        </p:par>
+                      </p:childTnLst>
+                    </p:cTn>
+                  </p:par>
+                  <p:par>
+                    <p:cTn id="15" fill="hold">
+                      <p:stCondLst>
+                        <p:cond delay="indefinite"/>
+                      </p:stCondLst>
+                      <p:childTnLst>
+                        <p:par>
+                          <p:cTn id="16" fill="hold">
+                            <p:stCondLst>
+                              <p:cond delay="0"/>
+                            </p:stCondLst>
+                            <p:childTnLst>
+                              <p:par>
+                                <p:cTn id="17" presetID="1" presetClass="entr" presetSubtype="0" fill="hold" grpId="0" nodeType="clickEffect">
+                                  <p:stCondLst>
+                                    <p:cond delay="0"/>
+                                  </p:stCondLst>
+                                  <p:childTnLst>
+                                    <p:set>
+                                      <p:cBhvr>
+                                        <p:cTn id="18" dur="1" fill="hold">
+                                          <p:stCondLst>
+                                            <p:cond delay="0"/>
+                                          </p:stCondLst>
+                                        </p:cTn>
+                                        <p:tgtEl>
+                                          <p:spTgt spid="18"/>
+                                        </p:tgtEl>
+                                        <p:attrNameLst>
+                                          <p:attrName>style.visibility</p:attrName>
+                                        </p:attrNameLst>
+                                      </p:cBhvr>
+                                      <p:to>
+                                        <p:strVal val="visible"/>
+                                      </p:to>
+                                    </p:set>
+                                  </p:childTnLst>
+                                </p:cTn>
+                              </p:par>
+                            </p:childTnLst>
+                          </p:cTn>
+                        </p:par>
+                      </p:childTnLst>
+                    </p:cTn>
+                  </p:par>
+                </p:childTnLst>
+              </p:cTn>
+              <p:prevCondLst>
+                <p:cond evt="onPrev" delay="0">
+                  <p:tgtEl>
+                    <p:sldTgt/>
+                  </p:tgtEl>
+                </p:cond>
+              </p:prevCondLst>
+              <p:nextCondLst>
+                <p:cond evt="onNext" delay="0">
+                  <p:tgtEl>
+                    <p:sldTgt/>
+                  </p:tgtEl>
+                </p:cond>
+              </p:nextCondLst>
+            </p:seq>
+          </p:childTnLst>
+        </p:cTn>
+      </p:par>
+    </p:tnLst>
+    <p:bldLst>
+      <p:bldP spid="19" grpId="0"/>
+      <p:bldP spid="18" grpId="0"/>
+    </p:bldLst>
+  </p:timing>
+</p:sld>
+</file>
+
+<file path=ppt/slides/slide33.xml><?xml version="1.0" encoding="utf-8"?>
+<p:sld xmlns:a="http://schemas.openxmlformats.org/drawingml/2006/main" xmlns:r="http://schemas.openxmlformats.org/officeDocument/2006/relationships" xmlns:p="http://schemas.openxmlformats.org/presentationml/2006/main">
+  <p:cSld>
+    <p:spTree>
+      <p:nvGrpSpPr>
+        <p:cNvPr id="1" name=""/>
+        <p:cNvGrpSpPr/>
+        <p:nvPr/>
+      </p:nvGrpSpPr>
+      <p:grpSpPr>
+        <a:xfrm>
+          <a:off x="0" y="0"/>
+          <a:ext cx="0" cy="0"/>
+          <a:chOff x="0" y="0"/>
+          <a:chExt cx="0" cy="0"/>
+        </a:xfrm>
+      </p:grpSpPr>
+      <p:sp>
+        <p:nvSpPr>
+          <p:cNvPr id="2" name="Title 1">
+            <a:extLst>
+              <a:ext uri="{FF2B5EF4-FFF2-40B4-BE49-F238E27FC236}">
                 <a16:creationId xmlns:a16="http://schemas.microsoft.com/office/drawing/2014/main" id="{20D531CB-863D-4E2C-8770-814F2568C05C}"/>
               </a:ext>
             </a:extLst>
@@ -13186,7 +14591,7 @@
           <a:p>
             <a:fld id="{7AE184E0-0BD4-4705-A12B-9B71DDE63301}" type="slidenum">
               <a:rPr lang="en-GB" noProof="0" smtClean="0"/>
-              <a:t>30</a:t>
+              <a:t>33</a:t>
             </a:fld>
             <a:endParaRPr lang="en-GB" noProof="0" dirty="0"/>
           </a:p>
@@ -14582,6 +15987,409 @@
           <p:cNvPr id="2" name="Title 1">
             <a:extLst>
               <a:ext uri="{FF2B5EF4-FFF2-40B4-BE49-F238E27FC236}">
+                <a16:creationId xmlns:a16="http://schemas.microsoft.com/office/drawing/2014/main" id="{C6A6D532-C35F-4BA0-B797-801888F8788F}"/>
+              </a:ext>
+            </a:extLst>
+          </p:cNvPr>
+          <p:cNvSpPr>
+            <a:spLocks noGrp="1"/>
+          </p:cNvSpPr>
+          <p:nvPr>
+            <p:ph type="title"/>
+          </p:nvPr>
+        </p:nvSpPr>
+        <p:spPr/>
+        <p:txBody>
+          <a:bodyPr/>
+          <a:lstStyle/>
+          <a:p>
+            <a:r>
+              <a:rPr lang="en-US" dirty="0"/>
+              <a:t>Hierarchical representations</a:t>
+            </a:r>
+            <a:endParaRPr lang="en-GB" dirty="0"/>
+          </a:p>
+        </p:txBody>
+      </p:sp>
+      <p:sp>
+        <p:nvSpPr>
+          <p:cNvPr id="3" name="Content Placeholder 2">
+            <a:extLst>
+              <a:ext uri="{FF2B5EF4-FFF2-40B4-BE49-F238E27FC236}">
+                <a16:creationId xmlns:a16="http://schemas.microsoft.com/office/drawing/2014/main" id="{7F4D8D24-3E4C-472E-A768-55208F416529}"/>
+              </a:ext>
+            </a:extLst>
+          </p:cNvPr>
+          <p:cNvSpPr>
+            <a:spLocks noGrp="1"/>
+          </p:cNvSpPr>
+          <p:nvPr>
+            <p:ph idx="1"/>
+          </p:nvPr>
+        </p:nvSpPr>
+        <p:spPr/>
+        <p:txBody>
+          <a:bodyPr/>
+          <a:lstStyle/>
+          <a:p>
+            <a:r>
+              <a:rPr lang="en-US" dirty="0"/>
+              <a:t>Decision making</a:t>
+            </a:r>
+            <a:endParaRPr lang="en-GB" dirty="0"/>
+          </a:p>
+        </p:txBody>
+      </p:sp>
+      <p:sp>
+        <p:nvSpPr>
+          <p:cNvPr id="4" name="Slide Number Placeholder 3">
+            <a:extLst>
+              <a:ext uri="{FF2B5EF4-FFF2-40B4-BE49-F238E27FC236}">
+                <a16:creationId xmlns:a16="http://schemas.microsoft.com/office/drawing/2014/main" id="{353D4AF2-C7B3-4019-BD65-C8DA6299BFBD}"/>
+              </a:ext>
+            </a:extLst>
+          </p:cNvPr>
+          <p:cNvSpPr>
+            <a:spLocks noGrp="1"/>
+          </p:cNvSpPr>
+          <p:nvPr>
+            <p:ph type="sldNum" sz="quarter" idx="12"/>
+          </p:nvPr>
+        </p:nvSpPr>
+        <p:spPr/>
+        <p:txBody>
+          <a:bodyPr/>
+          <a:lstStyle/>
+          <a:p>
+            <a:fld id="{7AE184E0-0BD4-4705-A12B-9B71DDE63301}" type="slidenum">
+              <a:rPr lang="en-GB" noProof="0" smtClean="0"/>
+              <a:t>6</a:t>
+            </a:fld>
+            <a:endParaRPr lang="en-GB" noProof="0" dirty="0"/>
+          </a:p>
+        </p:txBody>
+      </p:sp>
+      <p:pic>
+        <p:nvPicPr>
+          <p:cNvPr id="5" name="Picture 4">
+            <a:extLst>
+              <a:ext uri="{FF2B5EF4-FFF2-40B4-BE49-F238E27FC236}">
+                <a16:creationId xmlns:a16="http://schemas.microsoft.com/office/drawing/2014/main" id="{8E552282-2E96-4719-BC63-64494F35BA7B}"/>
+              </a:ext>
+            </a:extLst>
+          </p:cNvPr>
+          <p:cNvPicPr>
+            <a:picLocks noChangeAspect="1"/>
+          </p:cNvPicPr>
+          <p:nvPr/>
+        </p:nvPicPr>
+        <p:blipFill>
+          <a:blip r:embed="rId2"/>
+          <a:stretch>
+            <a:fillRect/>
+          </a:stretch>
+        </p:blipFill>
+        <p:spPr>
+          <a:xfrm>
+            <a:off x="985037" y="3151714"/>
+            <a:ext cx="2819400" cy="2781300"/>
+          </a:xfrm>
+          <a:prstGeom prst="rect">
+            <a:avLst/>
+          </a:prstGeom>
+        </p:spPr>
+      </p:pic>
+      <p:sp>
+        <p:nvSpPr>
+          <p:cNvPr id="6" name="TextBox 5">
+            <a:extLst>
+              <a:ext uri="{FF2B5EF4-FFF2-40B4-BE49-F238E27FC236}">
+                <a16:creationId xmlns:a16="http://schemas.microsoft.com/office/drawing/2014/main" id="{5ADD4388-1CE0-44E6-987C-A5DD665D62DD}"/>
+              </a:ext>
+            </a:extLst>
+          </p:cNvPr>
+          <p:cNvSpPr txBox="1"/>
+          <p:nvPr/>
+        </p:nvSpPr>
+        <p:spPr>
+          <a:xfrm>
+            <a:off x="7345290" y="7634556"/>
+            <a:ext cx="2674937" cy="511615"/>
+          </a:xfrm>
+          <a:prstGeom prst="rect">
+            <a:avLst/>
+          </a:prstGeom>
+          <a:noFill/>
+        </p:spPr>
+        <p:txBody>
+          <a:bodyPr wrap="square" rtlCol="0">
+            <a:spAutoFit/>
+          </a:bodyPr>
+          <a:lstStyle/>
+          <a:p>
+            <a:pPr algn="l">
+              <a:lnSpc>
+                <a:spcPct val="120000"/>
+              </a:lnSpc>
+            </a:pPr>
+            <a:r>
+              <a:rPr lang="en-US" sz="2500" dirty="0" err="1"/>
+              <a:t>Diuk</a:t>
+            </a:r>
+            <a:r>
+              <a:rPr lang="en-US" sz="2500" dirty="0"/>
+              <a:t> et al. (2008)</a:t>
+            </a:r>
+            <a:endParaRPr lang="en-GB" sz="2500" dirty="0"/>
+          </a:p>
+        </p:txBody>
+      </p:sp>
+      <p:pic>
+        <p:nvPicPr>
+          <p:cNvPr id="7" name="Picture 6">
+            <a:extLst>
+              <a:ext uri="{FF2B5EF4-FFF2-40B4-BE49-F238E27FC236}">
+                <a16:creationId xmlns:a16="http://schemas.microsoft.com/office/drawing/2014/main" id="{23866B52-A5C2-4823-BBFF-6787435E7B7C}"/>
+              </a:ext>
+            </a:extLst>
+          </p:cNvPr>
+          <p:cNvPicPr>
+            <a:picLocks noChangeAspect="1"/>
+          </p:cNvPicPr>
+          <p:nvPr/>
+        </p:nvPicPr>
+        <p:blipFill>
+          <a:blip r:embed="rId3"/>
+          <a:stretch>
+            <a:fillRect/>
+          </a:stretch>
+        </p:blipFill>
+        <p:spPr>
+          <a:xfrm>
+            <a:off x="4348162" y="2951689"/>
+            <a:ext cx="4894200" cy="3095625"/>
+          </a:xfrm>
+          <a:prstGeom prst="rect">
+            <a:avLst/>
+          </a:prstGeom>
+        </p:spPr>
+      </p:pic>
+    </p:spTree>
+    <p:extLst>
+      <p:ext uri="{BB962C8B-B14F-4D97-AF65-F5344CB8AC3E}">
+        <p14:creationId xmlns:p14="http://schemas.microsoft.com/office/powerpoint/2010/main" val="2851205402"/>
+      </p:ext>
+    </p:extLst>
+  </p:cSld>
+  <p:clrMapOvr>
+    <a:masterClrMapping/>
+  </p:clrMapOvr>
+  <p:timing>
+    <p:tnLst>
+      <p:par>
+        <p:cTn id="1" dur="indefinite" restart="never" nodeType="tmRoot">
+          <p:childTnLst>
+            <p:seq concurrent="1" nextAc="seek">
+              <p:cTn id="2" dur="indefinite" nodeType="mainSeq">
+                <p:childTnLst>
+                  <p:par>
+                    <p:cTn id="3" fill="hold">
+                      <p:stCondLst>
+                        <p:cond delay="indefinite"/>
+                      </p:stCondLst>
+                      <p:childTnLst>
+                        <p:par>
+                          <p:cTn id="4" fill="hold">
+                            <p:stCondLst>
+                              <p:cond delay="0"/>
+                            </p:stCondLst>
+                            <p:childTnLst>
+                              <p:par>
+                                <p:cTn id="5" presetID="1" presetClass="entr" presetSubtype="0" fill="hold" nodeType="clickEffect">
+                                  <p:stCondLst>
+                                    <p:cond delay="0"/>
+                                  </p:stCondLst>
+                                  <p:childTnLst>
+                                    <p:set>
+                                      <p:cBhvr>
+                                        <p:cTn id="6" dur="1" fill="hold">
+                                          <p:stCondLst>
+                                            <p:cond delay="0"/>
+                                          </p:stCondLst>
+                                        </p:cTn>
+                                        <p:tgtEl>
+                                          <p:spTgt spid="5"/>
+                                        </p:tgtEl>
+                                        <p:attrNameLst>
+                                          <p:attrName>style.visibility</p:attrName>
+                                        </p:attrNameLst>
+                                      </p:cBhvr>
+                                      <p:to>
+                                        <p:strVal val="visible"/>
+                                      </p:to>
+                                    </p:set>
+                                  </p:childTnLst>
+                                </p:cTn>
+                              </p:par>
+                              <p:par>
+                                <p:cTn id="7" presetID="1" presetClass="entr" presetSubtype="0" fill="hold" grpId="0" nodeType="withEffect">
+                                  <p:stCondLst>
+                                    <p:cond delay="0"/>
+                                  </p:stCondLst>
+                                  <p:childTnLst>
+                                    <p:set>
+                                      <p:cBhvr>
+                                        <p:cTn id="8" dur="1" fill="hold">
+                                          <p:stCondLst>
+                                            <p:cond delay="0"/>
+                                          </p:stCondLst>
+                                        </p:cTn>
+                                        <p:tgtEl>
+                                          <p:spTgt spid="6"/>
+                                        </p:tgtEl>
+                                        <p:attrNameLst>
+                                          <p:attrName>style.visibility</p:attrName>
+                                        </p:attrNameLst>
+                                      </p:cBhvr>
+                                      <p:to>
+                                        <p:strVal val="visible"/>
+                                      </p:to>
+                                    </p:set>
+                                  </p:childTnLst>
+                                </p:cTn>
+                              </p:par>
+                            </p:childTnLst>
+                          </p:cTn>
+                        </p:par>
+                      </p:childTnLst>
+                    </p:cTn>
+                  </p:par>
+                  <p:par>
+                    <p:cTn id="9" fill="hold">
+                      <p:stCondLst>
+                        <p:cond delay="indefinite"/>
+                      </p:stCondLst>
+                      <p:childTnLst>
+                        <p:par>
+                          <p:cTn id="10" fill="hold">
+                            <p:stCondLst>
+                              <p:cond delay="0"/>
+                            </p:stCondLst>
+                            <p:childTnLst>
+                              <p:par>
+                                <p:cTn id="11" presetID="1" presetClass="entr" presetSubtype="0" fill="hold" nodeType="clickEffect">
+                                  <p:stCondLst>
+                                    <p:cond delay="0"/>
+                                  </p:stCondLst>
+                                  <p:childTnLst>
+                                    <p:set>
+                                      <p:cBhvr>
+                                        <p:cTn id="12" dur="1" fill="hold">
+                                          <p:stCondLst>
+                                            <p:cond delay="0"/>
+                                          </p:stCondLst>
+                                        </p:cTn>
+                                        <p:tgtEl>
+                                          <p:spTgt spid="7"/>
+                                        </p:tgtEl>
+                                        <p:attrNameLst>
+                                          <p:attrName>style.visibility</p:attrName>
+                                        </p:attrNameLst>
+                                      </p:cBhvr>
+                                      <p:to>
+                                        <p:strVal val="visible"/>
+                                      </p:to>
+                                    </p:set>
+                                  </p:childTnLst>
+                                </p:cTn>
+                              </p:par>
+                              <p:par>
+                                <p:cTn id="13" presetID="9" presetClass="emph" presetSubtype="0" nodeType="withEffect">
+                                  <p:stCondLst>
+                                    <p:cond delay="0"/>
+                                  </p:stCondLst>
+                                  <p:childTnLst>
+                                    <p:set>
+                                      <p:cBhvr>
+                                        <p:cTn id="14" dur="indefinite"/>
+                                        <p:tgtEl>
+                                          <p:spTgt spid="5"/>
+                                        </p:tgtEl>
+                                        <p:attrNameLst>
+                                          <p:attrName>style.opacity</p:attrName>
+                                        </p:attrNameLst>
+                                      </p:cBhvr>
+                                      <p:to>
+                                        <p:strVal val="0.5"/>
+                                      </p:to>
+                                    </p:set>
+                                    <p:animEffect filter="image" prLst="opacity: 0.5">
+                                      <p:cBhvr rctx="IE">
+                                        <p:cTn id="15" dur="indefinite"/>
+                                        <p:tgtEl>
+                                          <p:spTgt spid="5"/>
+                                        </p:tgtEl>
+                                      </p:cBhvr>
+                                    </p:animEffect>
+                                  </p:childTnLst>
+                                </p:cTn>
+                              </p:par>
+                            </p:childTnLst>
+                          </p:cTn>
+                        </p:par>
+                      </p:childTnLst>
+                    </p:cTn>
+                  </p:par>
+                </p:childTnLst>
+              </p:cTn>
+              <p:prevCondLst>
+                <p:cond evt="onPrev" delay="0">
+                  <p:tgtEl>
+                    <p:sldTgt/>
+                  </p:tgtEl>
+                </p:cond>
+              </p:prevCondLst>
+              <p:nextCondLst>
+                <p:cond evt="onNext" delay="0">
+                  <p:tgtEl>
+                    <p:sldTgt/>
+                  </p:tgtEl>
+                </p:cond>
+              </p:nextCondLst>
+            </p:seq>
+          </p:childTnLst>
+        </p:cTn>
+      </p:par>
+    </p:tnLst>
+    <p:bldLst>
+      <p:bldP spid="6" grpId="0"/>
+    </p:bldLst>
+  </p:timing>
+</p:sld>
+</file>
+
+<file path=ppt/slides/slide7.xml><?xml version="1.0" encoding="utf-8"?>
+<p:sld xmlns:a="http://schemas.openxmlformats.org/drawingml/2006/main" xmlns:r="http://schemas.openxmlformats.org/officeDocument/2006/relationships" xmlns:p="http://schemas.openxmlformats.org/presentationml/2006/main">
+  <p:cSld>
+    <p:spTree>
+      <p:nvGrpSpPr>
+        <p:cNvPr id="1" name=""/>
+        <p:cNvGrpSpPr/>
+        <p:nvPr/>
+      </p:nvGrpSpPr>
+      <p:grpSpPr>
+        <a:xfrm>
+          <a:off x="0" y="0"/>
+          <a:ext cx="0" cy="0"/>
+          <a:chOff x="0" y="0"/>
+          <a:chExt cx="0" cy="0"/>
+        </a:xfrm>
+      </p:grpSpPr>
+      <p:sp>
+        <p:nvSpPr>
+          <p:cNvPr id="2" name="Title 1">
+            <a:extLst>
+              <a:ext uri="{FF2B5EF4-FFF2-40B4-BE49-F238E27FC236}">
                 <a16:creationId xmlns:a16="http://schemas.microsoft.com/office/drawing/2014/main" id="{5D8C7FCC-48DA-4588-A3DC-8C134E3C3121}"/>
               </a:ext>
             </a:extLst>
@@ -14658,7 +16466,7 @@
           <a:p>
             <a:fld id="{7AE184E0-0BD4-4705-A12B-9B71DDE63301}" type="slidenum">
               <a:rPr lang="en-GB" noProof="0" smtClean="0"/>
-              <a:t>6</a:t>
+              <a:t>7</a:t>
             </a:fld>
             <a:endParaRPr lang="en-GB" noProof="0" dirty="0"/>
           </a:p>
@@ -14985,83 +16793,6 @@
 </p:sld>
 </file>
 
-<file path=ppt/slides/slide7.xml><?xml version="1.0" encoding="utf-8"?>
-<p:sld xmlns:a="http://schemas.openxmlformats.org/drawingml/2006/main" xmlns:r="http://schemas.openxmlformats.org/officeDocument/2006/relationships" xmlns:p="http://schemas.openxmlformats.org/presentationml/2006/main">
-  <p:cSld>
-    <p:spTree>
-      <p:nvGrpSpPr>
-        <p:cNvPr id="1" name=""/>
-        <p:cNvGrpSpPr/>
-        <p:nvPr/>
-      </p:nvGrpSpPr>
-      <p:grpSpPr>
-        <a:xfrm>
-          <a:off x="0" y="0"/>
-          <a:ext cx="0" cy="0"/>
-          <a:chOff x="0" y="0"/>
-          <a:chExt cx="0" cy="0"/>
-        </a:xfrm>
-      </p:grpSpPr>
-      <p:sp>
-        <p:nvSpPr>
-          <p:cNvPr id="2" name="Picture Placeholder 1">
-            <a:extLst>
-              <a:ext uri="{FF2B5EF4-FFF2-40B4-BE49-F238E27FC236}">
-                <a16:creationId xmlns:a16="http://schemas.microsoft.com/office/drawing/2014/main" id="{8ECEC344-801B-405D-86DB-B66A08C335EB}"/>
-              </a:ext>
-            </a:extLst>
-          </p:cNvPr>
-          <p:cNvSpPr>
-            <a:spLocks noGrp="1"/>
-          </p:cNvSpPr>
-          <p:nvPr>
-            <p:ph type="pic" sz="quarter" idx="12"/>
-          </p:nvPr>
-        </p:nvSpPr>
-        <p:spPr/>
-      </p:sp>
-      <p:sp>
-        <p:nvSpPr>
-          <p:cNvPr id="3" name="Text Placeholder 2">
-            <a:extLst>
-              <a:ext uri="{FF2B5EF4-FFF2-40B4-BE49-F238E27FC236}">
-                <a16:creationId xmlns:a16="http://schemas.microsoft.com/office/drawing/2014/main" id="{0311A150-355A-4F1C-9639-2564A971BF07}"/>
-              </a:ext>
-            </a:extLst>
-          </p:cNvPr>
-          <p:cNvSpPr>
-            <a:spLocks noGrp="1"/>
-          </p:cNvSpPr>
-          <p:nvPr>
-            <p:ph type="body" sz="quarter" idx="13"/>
-          </p:nvPr>
-        </p:nvSpPr>
-        <p:spPr/>
-        <p:txBody>
-          <a:bodyPr/>
-          <a:lstStyle/>
-          <a:p>
-            <a:r>
-              <a:rPr lang="en-US" dirty="0"/>
-              <a:t>New Task</a:t>
-            </a:r>
-            <a:endParaRPr lang="en-GB" dirty="0"/>
-          </a:p>
-        </p:txBody>
-      </p:sp>
-    </p:spTree>
-    <p:extLst>
-      <p:ext uri="{BB962C8B-B14F-4D97-AF65-F5344CB8AC3E}">
-        <p14:creationId xmlns:p14="http://schemas.microsoft.com/office/powerpoint/2010/main" val="4258186519"/>
-      </p:ext>
-    </p:extLst>
-  </p:cSld>
-  <p:clrMapOvr>
-    <a:masterClrMapping/>
-  </p:clrMapOvr>
-</p:sld>
-</file>
-
 <file path=ppt/slides/slide8.xml><?xml version="1.0" encoding="utf-8"?>
 <p:sld xmlns:a="http://schemas.openxmlformats.org/drawingml/2006/main" xmlns:r="http://schemas.openxmlformats.org/officeDocument/2006/relationships" xmlns:p="http://schemas.openxmlformats.org/presentationml/2006/main">
   <p:cSld>
@@ -15081,10 +16812,87 @@
       </p:grpSpPr>
       <p:sp>
         <p:nvSpPr>
+          <p:cNvPr id="2" name="Picture Placeholder 1">
+            <a:extLst>
+              <a:ext uri="{FF2B5EF4-FFF2-40B4-BE49-F238E27FC236}">
+                <a16:creationId xmlns:a16="http://schemas.microsoft.com/office/drawing/2014/main" id="{37D4E09B-35C2-4D21-BD3C-4657E5BAFE3D}"/>
+              </a:ext>
+            </a:extLst>
+          </p:cNvPr>
+          <p:cNvSpPr>
+            <a:spLocks noGrp="1"/>
+          </p:cNvSpPr>
+          <p:nvPr>
+            <p:ph type="pic" sz="quarter" idx="12"/>
+          </p:nvPr>
+        </p:nvSpPr>
+        <p:spPr/>
+      </p:sp>
+      <p:sp>
+        <p:nvSpPr>
+          <p:cNvPr id="3" name="Text Placeholder 2">
+            <a:extLst>
+              <a:ext uri="{FF2B5EF4-FFF2-40B4-BE49-F238E27FC236}">
+                <a16:creationId xmlns:a16="http://schemas.microsoft.com/office/drawing/2014/main" id="{270DCA83-7210-47F0-A013-633DF09E100A}"/>
+              </a:ext>
+            </a:extLst>
+          </p:cNvPr>
+          <p:cNvSpPr>
+            <a:spLocks noGrp="1"/>
+          </p:cNvSpPr>
+          <p:nvPr>
+            <p:ph type="body" sz="quarter" idx="13"/>
+          </p:nvPr>
+        </p:nvSpPr>
+        <p:spPr/>
+        <p:txBody>
+          <a:bodyPr/>
+          <a:lstStyle/>
+          <a:p>
+            <a:r>
+              <a:rPr lang="en-US" dirty="0"/>
+              <a:t>What’s Next?</a:t>
+            </a:r>
+            <a:endParaRPr lang="en-GB" dirty="0"/>
+          </a:p>
+        </p:txBody>
+      </p:sp>
+    </p:spTree>
+    <p:extLst>
+      <p:ext uri="{BB962C8B-B14F-4D97-AF65-F5344CB8AC3E}">
+        <p14:creationId xmlns:p14="http://schemas.microsoft.com/office/powerpoint/2010/main" val="902640810"/>
+      </p:ext>
+    </p:extLst>
+  </p:cSld>
+  <p:clrMapOvr>
+    <a:masterClrMapping/>
+  </p:clrMapOvr>
+</p:sld>
+</file>
+
+<file path=ppt/slides/slide9.xml><?xml version="1.0" encoding="utf-8"?>
+<p:sld xmlns:a="http://schemas.openxmlformats.org/drawingml/2006/main" xmlns:r="http://schemas.openxmlformats.org/officeDocument/2006/relationships" xmlns:p="http://schemas.openxmlformats.org/presentationml/2006/main">
+  <p:cSld>
+    <p:spTree>
+      <p:nvGrpSpPr>
+        <p:cNvPr id="1" name=""/>
+        <p:cNvGrpSpPr/>
+        <p:nvPr/>
+      </p:nvGrpSpPr>
+      <p:grpSpPr>
+        <a:xfrm>
+          <a:off x="0" y="0"/>
+          <a:ext cx="0" cy="0"/>
+          <a:chOff x="0" y="0"/>
+          <a:chExt cx="0" cy="0"/>
+        </a:xfrm>
+      </p:grpSpPr>
+      <p:sp>
+        <p:nvSpPr>
           <p:cNvPr id="2" name="Title 1">
             <a:extLst>
               <a:ext uri="{FF2B5EF4-FFF2-40B4-BE49-F238E27FC236}">
-                <a16:creationId xmlns:a16="http://schemas.microsoft.com/office/drawing/2014/main" id="{419414DF-20DA-4104-827D-FB22F577D4B8}"/>
+                <a16:creationId xmlns:a16="http://schemas.microsoft.com/office/drawing/2014/main" id="{E80C4EE1-5298-4D22-915B-3F34254BA81E}"/>
               </a:ext>
             </a:extLst>
           </p:cNvPr>
@@ -15102,7 +16910,7 @@
           <a:p>
             <a:r>
               <a:rPr lang="en-US" dirty="0"/>
-              <a:t>Online pilot</a:t>
+              <a:t>Questions</a:t>
             </a:r>
             <a:endParaRPr lang="en-GB" dirty="0"/>
           </a:p>
@@ -15113,7 +16921,7 @@
           <p:cNvPr id="3" name="Content Placeholder 2">
             <a:extLst>
               <a:ext uri="{FF2B5EF4-FFF2-40B4-BE49-F238E27FC236}">
-                <a16:creationId xmlns:a16="http://schemas.microsoft.com/office/drawing/2014/main" id="{AF18B125-670D-4BCE-89CA-D5A9A14567DB}"/>
+                <a16:creationId xmlns:a16="http://schemas.microsoft.com/office/drawing/2014/main" id="{F070580A-C032-491B-A46F-605419A206B7}"/>
               </a:ext>
             </a:extLst>
           </p:cNvPr>
@@ -15130,14 +16938,51 @@
           <a:lstStyle/>
           <a:p>
             <a:r>
+              <a:rPr lang="en-US" dirty="0"/>
+              <a:t>Does this influence decision making </a:t>
+            </a:r>
+            <a:r>
               <a:rPr lang="en-US" dirty="0" err="1"/>
-              <a:t>Behavioural</a:t>
+              <a:t>behaviour</a:t>
             </a:r>
             <a:r>
               <a:rPr lang="en-US" dirty="0"/>
-              <a:t> task / learning</a:t>
+              <a:t>?</a:t>
             </a:r>
             <a:endParaRPr lang="en-GB" dirty="0"/>
+          </a:p>
+          <a:p>
+            <a:pPr lvl="1"/>
+            <a:r>
+              <a:rPr lang="en-GB" dirty="0"/>
+              <a:t>State space representation</a:t>
+            </a:r>
+          </a:p>
+          <a:p>
+            <a:r>
+              <a:rPr lang="en-GB" dirty="0"/>
+              <a:t>Can we detect specific influence in EEG</a:t>
+            </a:r>
+          </a:p>
+          <a:p>
+            <a:pPr lvl="1"/>
+            <a:r>
+              <a:rPr lang="en-GB" dirty="0"/>
+              <a:t>State space for RL: </a:t>
+            </a:r>
+            <a:r>
+              <a:rPr lang="en-GB" dirty="0" err="1"/>
+              <a:t>RewPos</a:t>
+            </a:r>
+            <a:endParaRPr lang="en-GB" dirty="0"/>
+          </a:p>
+          <a:p>
+            <a:pPr lvl="1"/>
+            <a:r>
+              <a:rPr lang="en-GB" dirty="0"/>
+              <a:t>Statistical learning in general: N2/P3</a:t>
+            </a:r>
+            <a:endParaRPr lang="en-US" dirty="0"/>
           </a:p>
         </p:txBody>
       </p:sp>
@@ -15146,7 +16991,7 @@
           <p:cNvPr id="4" name="Slide Number Placeholder 3">
             <a:extLst>
               <a:ext uri="{FF2B5EF4-FFF2-40B4-BE49-F238E27FC236}">
-                <a16:creationId xmlns:a16="http://schemas.microsoft.com/office/drawing/2014/main" id="{DD878199-45CF-47A6-A052-93F90E40CF0C}"/>
+                <a16:creationId xmlns:a16="http://schemas.microsoft.com/office/drawing/2014/main" id="{A0A09712-E52F-4149-8842-9E17EB1C3DB7}"/>
               </a:ext>
             </a:extLst>
           </p:cNvPr>
@@ -15164,179 +17009,16 @@
           <a:p>
             <a:fld id="{7AE184E0-0BD4-4705-A12B-9B71DDE63301}" type="slidenum">
               <a:rPr lang="en-GB" noProof="0" smtClean="0"/>
-              <a:t>8</a:t>
+              <a:t>9</a:t>
             </a:fld>
             <a:endParaRPr lang="en-GB" noProof="0" dirty="0"/>
-          </a:p>
-        </p:txBody>
-      </p:sp>
-      <p:pic>
-        <p:nvPicPr>
-          <p:cNvPr id="8" name="Graphic 7">
-            <a:extLst>
-              <a:ext uri="{FF2B5EF4-FFF2-40B4-BE49-F238E27FC236}">
-                <a16:creationId xmlns:a16="http://schemas.microsoft.com/office/drawing/2014/main" id="{A3CEF66E-BA22-4261-892A-8B3CEA3AD98D}"/>
-              </a:ext>
-            </a:extLst>
-          </p:cNvPr>
-          <p:cNvPicPr>
-            <a:picLocks noChangeAspect="1"/>
-          </p:cNvPicPr>
-          <p:nvPr/>
-        </p:nvPicPr>
-        <p:blipFill>
-          <a:blip r:embed="rId2">
-            <a:extLst>
-              <a:ext uri="{28A0092B-C50C-407E-A947-70E740481C1C}">
-                <a14:useLocalDpi xmlns:a14="http://schemas.microsoft.com/office/drawing/2010/main" val="0"/>
-              </a:ext>
-              <a:ext uri="{96DAC541-7B7A-43D3-8B79-37D633B846F1}">
-                <asvg:svgBlip xmlns:asvg="http://schemas.microsoft.com/office/drawing/2016/SVG/main" r:embed="rId3"/>
-              </a:ext>
-            </a:extLst>
-          </a:blip>
-          <a:stretch>
-            <a:fillRect/>
-          </a:stretch>
-        </p:blipFill>
-        <p:spPr>
-          <a:xfrm>
-            <a:off x="830118" y="2137559"/>
-            <a:ext cx="5752806" cy="5752806"/>
-          </a:xfrm>
-          <a:prstGeom prst="rect">
-            <a:avLst/>
-          </a:prstGeom>
-        </p:spPr>
-      </p:pic>
-      <p:sp>
-        <p:nvSpPr>
-          <p:cNvPr id="9" name="TextBox 8">
-            <a:extLst>
-              <a:ext uri="{FF2B5EF4-FFF2-40B4-BE49-F238E27FC236}">
-                <a16:creationId xmlns:a16="http://schemas.microsoft.com/office/drawing/2014/main" id="{F01FBE16-D860-4653-9508-CBED61FE22B5}"/>
-              </a:ext>
-            </a:extLst>
-          </p:cNvPr>
-          <p:cNvSpPr txBox="1"/>
-          <p:nvPr/>
-        </p:nvSpPr>
-        <p:spPr>
-          <a:xfrm>
-            <a:off x="8122722" y="2743200"/>
-            <a:ext cx="5296395" cy="973280"/>
-          </a:xfrm>
-          <a:prstGeom prst="rect">
-            <a:avLst/>
-          </a:prstGeom>
-          <a:noFill/>
-        </p:spPr>
-        <p:txBody>
-          <a:bodyPr wrap="square" rtlCol="0">
-            <a:spAutoFit/>
-          </a:bodyPr>
-          <a:lstStyle/>
-          <a:p>
-            <a:pPr marL="342900" indent="-342900" algn="l">
-              <a:lnSpc>
-                <a:spcPct val="120000"/>
-              </a:lnSpc>
-              <a:buFont typeface="Arial" panose="020B0604020202020204" pitchFamily="34" charset="0"/>
-              <a:buChar char="‒"/>
-            </a:pPr>
-            <a:r>
-              <a:rPr lang="en-US" sz="2500" dirty="0"/>
-              <a:t>Starting positions</a:t>
-            </a:r>
-          </a:p>
-          <a:p>
-            <a:pPr marL="342900" indent="-342900" algn="l">
-              <a:lnSpc>
-                <a:spcPct val="120000"/>
-              </a:lnSpc>
-              <a:buFont typeface="Arial" panose="020B0604020202020204" pitchFamily="34" charset="0"/>
-              <a:buChar char="‒"/>
-            </a:pPr>
-            <a:r>
-              <a:rPr lang="en-US" sz="2500" dirty="0"/>
-              <a:t>Goal positions</a:t>
-            </a:r>
-          </a:p>
-        </p:txBody>
-      </p:sp>
-      <p:sp>
-        <p:nvSpPr>
-          <p:cNvPr id="10" name="TextBox 9">
-            <a:extLst>
-              <a:ext uri="{FF2B5EF4-FFF2-40B4-BE49-F238E27FC236}">
-                <a16:creationId xmlns:a16="http://schemas.microsoft.com/office/drawing/2014/main" id="{D54124C3-436E-4280-BD38-EF55626FF297}"/>
-              </a:ext>
-            </a:extLst>
-          </p:cNvPr>
-          <p:cNvSpPr txBox="1"/>
-          <p:nvPr/>
-        </p:nvSpPr>
-        <p:spPr>
-          <a:xfrm>
-            <a:off x="8122722" y="4718480"/>
-            <a:ext cx="4358244" cy="1434945"/>
-          </a:xfrm>
-          <a:prstGeom prst="rect">
-            <a:avLst/>
-          </a:prstGeom>
-          <a:noFill/>
-        </p:spPr>
-        <p:txBody>
-          <a:bodyPr wrap="square" rtlCol="0">
-            <a:spAutoFit/>
-          </a:bodyPr>
-          <a:lstStyle/>
-          <a:p>
-            <a:pPr marL="342900" indent="-342900" algn="l">
-              <a:lnSpc>
-                <a:spcPct val="120000"/>
-              </a:lnSpc>
-              <a:buFont typeface="Arial" panose="020B0604020202020204" pitchFamily="34" charset="0"/>
-              <a:buChar char="‒"/>
-            </a:pPr>
-            <a:r>
-              <a:rPr lang="en-US" sz="2500" dirty="0"/>
-              <a:t>Points</a:t>
-            </a:r>
-          </a:p>
-          <a:p>
-            <a:pPr marL="342900" indent="-342900" algn="l">
-              <a:lnSpc>
-                <a:spcPct val="120000"/>
-              </a:lnSpc>
-              <a:buFont typeface="Arial" panose="020B0604020202020204" pitchFamily="34" charset="0"/>
-              <a:buChar char="‒"/>
-            </a:pPr>
-            <a:r>
-              <a:rPr lang="en-US" sz="2500" dirty="0"/>
-              <a:t>15 Steps</a:t>
-            </a:r>
-          </a:p>
-          <a:p>
-            <a:pPr marL="342900" indent="-342900" algn="l">
-              <a:lnSpc>
-                <a:spcPct val="120000"/>
-              </a:lnSpc>
-              <a:buFont typeface="Arial" panose="020B0604020202020204" pitchFamily="34" charset="0"/>
-              <a:buChar char="‒"/>
-            </a:pPr>
-            <a:r>
-              <a:rPr lang="en-US" sz="2500" dirty="0"/>
-              <a:t>Differing policies</a:t>
-            </a:r>
-            <a:endParaRPr lang="en-GB" sz="2500" dirty="0"/>
           </a:p>
         </p:txBody>
       </p:sp>
     </p:spTree>
     <p:extLst>
       <p:ext uri="{BB962C8B-B14F-4D97-AF65-F5344CB8AC3E}">
-        <p14:creationId xmlns:p14="http://schemas.microsoft.com/office/powerpoint/2010/main" val="2561075111"/>
+        <p14:creationId xmlns:p14="http://schemas.microsoft.com/office/powerpoint/2010/main" val="222546525"/>
       </p:ext>
     </p:extLst>
   </p:cSld>
@@ -15364,7 +17046,7 @@
                             </p:stCondLst>
                             <p:childTnLst>
                               <p:par>
-                                <p:cTn id="5" presetID="1" presetClass="entr" presetSubtype="0" fill="hold" nodeType="clickEffect">
+                                <p:cTn id="5" presetID="1" presetClass="entr" presetSubtype="0" fill="hold" grpId="0" nodeType="clickEffect">
                                   <p:stCondLst>
                                     <p:cond delay="0"/>
                                   </p:stCondLst>
@@ -15377,7 +17059,11 @@
                                           </p:stCondLst>
                                         </p:cTn>
                                         <p:tgtEl>
-                                          <p:spTgt spid="8"/>
+                                          <p:spTgt spid="3">
+                                            <p:txEl>
+                                              <p:pRg st="0" end="0"/>
+                                            </p:txEl>
+                                          </p:spTgt>
                                         </p:tgtEl>
                                         <p:attrNameLst>
                                           <p:attrName>style.visibility</p:attrName>
@@ -15422,9 +17108,9 @@
                                           </p:stCondLst>
                                         </p:cTn>
                                         <p:tgtEl>
-                                          <p:spTgt spid="9">
+                                          <p:spTgt spid="3">
                                             <p:txEl>
-                                              <p:pRg st="0" end="0"/>
+                                              <p:pRg st="1" end="1"/>
                                             </p:txEl>
                                           </p:spTgt>
                                         </p:tgtEl>
@@ -15471,9 +17157,9 @@
                                           </p:stCondLst>
                                         </p:cTn>
                                         <p:tgtEl>
-                                          <p:spTgt spid="9">
+                                          <p:spTgt spid="3">
                                             <p:txEl>
-                                              <p:pRg st="1" end="1"/>
+                                              <p:pRg st="2" end="2"/>
                                             </p:txEl>
                                           </p:spTgt>
                                         </p:tgtEl>
@@ -15520,9 +17206,9 @@
                                           </p:stCondLst>
                                         </p:cTn>
                                         <p:tgtEl>
-                                          <p:spTgt spid="10">
+                                          <p:spTgt spid="3">
                                             <p:txEl>
-                                              <p:pRg st="0" end="0"/>
+                                              <p:pRg st="3" end="3"/>
                                             </p:txEl>
                                           </p:spTgt>
                                         </p:tgtEl>
@@ -15569,58 +17255,9 @@
                                           </p:stCondLst>
                                         </p:cTn>
                                         <p:tgtEl>
-                                          <p:spTgt spid="10">
+                                          <p:spTgt spid="3">
                                             <p:txEl>
-                                              <p:pRg st="1" end="1"/>
-                                            </p:txEl>
-                                          </p:spTgt>
-                                        </p:tgtEl>
-                                        <p:attrNameLst>
-                                          <p:attrName>style.visibility</p:attrName>
-                                        </p:attrNameLst>
-                                      </p:cBhvr>
-                                      <p:to>
-                                        <p:strVal val="visible"/>
-                                      </p:to>
-                                    </p:set>
-                                  </p:childTnLst>
-                                </p:cTn>
-                              </p:par>
-                            </p:childTnLst>
-                          </p:cTn>
-                        </p:par>
-                      </p:childTnLst>
-                    </p:cTn>
-                  </p:par>
-                  <p:par>
-                    <p:cTn id="23" fill="hold">
-                      <p:stCondLst>
-                        <p:cond delay="indefinite"/>
-                      </p:stCondLst>
-                      <p:childTnLst>
-                        <p:par>
-                          <p:cTn id="24" fill="hold">
-                            <p:stCondLst>
-                              <p:cond delay="0"/>
-                            </p:stCondLst>
-                            <p:childTnLst>
-                              <p:par>
-                                <p:cTn id="25" presetID="1" presetClass="entr" presetSubtype="0" fill="hold" grpId="0" nodeType="clickEffect">
-                                  <p:stCondLst>
-                                    <p:cond delay="0"/>
-                                  </p:stCondLst>
-                                  <p:childTnLst>
-                                    <p:set>
-                                      <p:cBhvr>
-                                        <p:cTn id="26" dur="1" fill="hold">
-                                          <p:stCondLst>
-                                            <p:cond delay="0"/>
-                                          </p:stCondLst>
-                                        </p:cTn>
-                                        <p:tgtEl>
-                                          <p:spTgt spid="10">
-                                            <p:txEl>
-                                              <p:pRg st="2" end="2"/>
+                                              <p:pRg st="4" end="4"/>
                                             </p:txEl>
                                           </p:spTgt>
                                         </p:tgtEl>
@@ -15663,127 +17300,9 @@
       </p:par>
     </p:tnLst>
     <p:bldLst>
-      <p:bldP spid="9" grpId="0" build="p"/>
-      <p:bldP spid="10" grpId="0" build="p"/>
+      <p:bldP spid="3" grpId="0" build="p" bldLvl="2"/>
     </p:bldLst>
   </p:timing>
-</p:sld>
-</file>
-
-<file path=ppt/slides/slide9.xml><?xml version="1.0" encoding="utf-8"?>
-<p:sld xmlns:a="http://schemas.openxmlformats.org/drawingml/2006/main" xmlns:r="http://schemas.openxmlformats.org/officeDocument/2006/relationships" xmlns:p="http://schemas.openxmlformats.org/presentationml/2006/main">
-  <p:cSld>
-    <p:spTree>
-      <p:nvGrpSpPr>
-        <p:cNvPr id="1" name=""/>
-        <p:cNvGrpSpPr/>
-        <p:nvPr/>
-      </p:nvGrpSpPr>
-      <p:grpSpPr>
-        <a:xfrm>
-          <a:off x="0" y="0"/>
-          <a:ext cx="0" cy="0"/>
-          <a:chOff x="0" y="0"/>
-          <a:chExt cx="0" cy="0"/>
-        </a:xfrm>
-      </p:grpSpPr>
-      <p:sp>
-        <p:nvSpPr>
-          <p:cNvPr id="2" name="Title 1">
-            <a:extLst>
-              <a:ext uri="{FF2B5EF4-FFF2-40B4-BE49-F238E27FC236}">
-                <a16:creationId xmlns:a16="http://schemas.microsoft.com/office/drawing/2014/main" id="{B58DD1FA-DF4E-4A82-A3AF-AA0371AC5AE3}"/>
-              </a:ext>
-            </a:extLst>
-          </p:cNvPr>
-          <p:cNvSpPr>
-            <a:spLocks noGrp="1"/>
-          </p:cNvSpPr>
-          <p:nvPr>
-            <p:ph type="title"/>
-          </p:nvPr>
-        </p:nvSpPr>
-        <p:spPr/>
-        <p:txBody>
-          <a:bodyPr/>
-          <a:lstStyle/>
-          <a:p>
-            <a:r>
-              <a:rPr lang="en-US" dirty="0"/>
-              <a:t>Online pilot</a:t>
-            </a:r>
-            <a:endParaRPr lang="en-GB" dirty="0"/>
-          </a:p>
-        </p:txBody>
-      </p:sp>
-      <p:sp>
-        <p:nvSpPr>
-          <p:cNvPr id="3" name="Content Placeholder 2">
-            <a:extLst>
-              <a:ext uri="{FF2B5EF4-FFF2-40B4-BE49-F238E27FC236}">
-                <a16:creationId xmlns:a16="http://schemas.microsoft.com/office/drawing/2014/main" id="{24062063-E8DA-4C52-82ED-4422BF804C76}"/>
-              </a:ext>
-            </a:extLst>
-          </p:cNvPr>
-          <p:cNvSpPr>
-            <a:spLocks noGrp="1"/>
-          </p:cNvSpPr>
-          <p:nvPr>
-            <p:ph idx="1"/>
-          </p:nvPr>
-        </p:nvSpPr>
-        <p:spPr/>
-        <p:txBody>
-          <a:bodyPr/>
-          <a:lstStyle/>
-          <a:p>
-            <a:r>
-              <a:rPr lang="en-US" dirty="0"/>
-              <a:t>Stimuli</a:t>
-            </a:r>
-            <a:endParaRPr lang="en-GB" dirty="0"/>
-          </a:p>
-        </p:txBody>
-      </p:sp>
-      <p:sp>
-        <p:nvSpPr>
-          <p:cNvPr id="4" name="Slide Number Placeholder 3">
-            <a:extLst>
-              <a:ext uri="{FF2B5EF4-FFF2-40B4-BE49-F238E27FC236}">
-                <a16:creationId xmlns:a16="http://schemas.microsoft.com/office/drawing/2014/main" id="{F786CB64-FCFE-4115-8E9A-4F5862C8FA75}"/>
-              </a:ext>
-            </a:extLst>
-          </p:cNvPr>
-          <p:cNvSpPr>
-            <a:spLocks noGrp="1"/>
-          </p:cNvSpPr>
-          <p:nvPr>
-            <p:ph type="sldNum" sz="quarter" idx="12"/>
-          </p:nvPr>
-        </p:nvSpPr>
-        <p:spPr/>
-        <p:txBody>
-          <a:bodyPr/>
-          <a:lstStyle/>
-          <a:p>
-            <a:fld id="{7AE184E0-0BD4-4705-A12B-9B71DDE63301}" type="slidenum">
-              <a:rPr lang="en-GB" noProof="0" smtClean="0"/>
-              <a:t>9</a:t>
-            </a:fld>
-            <a:endParaRPr lang="en-GB" noProof="0" dirty="0"/>
-          </a:p>
-        </p:txBody>
-      </p:sp>
-    </p:spTree>
-    <p:extLst>
-      <p:ext uri="{BB962C8B-B14F-4D97-AF65-F5344CB8AC3E}">
-        <p14:creationId xmlns:p14="http://schemas.microsoft.com/office/powerpoint/2010/main" val="3771963055"/>
-      </p:ext>
-    </p:extLst>
-  </p:cSld>
-  <p:clrMapOvr>
-    <a:masterClrMapping/>
-  </p:clrMapOvr>
 </p:sld>
 </file>
 

</xml_diff>